<commit_message>
Working on some slides
</commit_message>
<xml_diff>
--- a/Slides/C#/1. Introduction to the .NET FRAMEWORK/1. Intoduction to .NET.pptx
+++ b/Slides/C#/1. Introduction to the .NET FRAMEWORK/1. Intoduction to .NET.pptx
@@ -5,26 +5,31 @@
     <p:sldMasterId id="2147483648" r:id="rId1"/>
   </p:sldMasterIdLst>
   <p:notesMasterIdLst>
-    <p:notesMasterId r:id="rId19"/>
+    <p:notesMasterId r:id="rId24"/>
   </p:notesMasterIdLst>
   <p:sldIdLst>
     <p:sldId id="258" r:id="rId2"/>
     <p:sldId id="257" r:id="rId3"/>
-    <p:sldId id="273" r:id="rId4"/>
-    <p:sldId id="259" r:id="rId5"/>
-    <p:sldId id="260" r:id="rId6"/>
-    <p:sldId id="261" r:id="rId7"/>
-    <p:sldId id="262" r:id="rId8"/>
-    <p:sldId id="263" r:id="rId9"/>
-    <p:sldId id="264" r:id="rId10"/>
-    <p:sldId id="265" r:id="rId11"/>
-    <p:sldId id="266" r:id="rId12"/>
-    <p:sldId id="267" r:id="rId13"/>
-    <p:sldId id="268" r:id="rId14"/>
-    <p:sldId id="269" r:id="rId15"/>
-    <p:sldId id="270" r:id="rId16"/>
-    <p:sldId id="271" r:id="rId17"/>
-    <p:sldId id="272" r:id="rId18"/>
+    <p:sldId id="259" r:id="rId4"/>
+    <p:sldId id="260" r:id="rId5"/>
+    <p:sldId id="261" r:id="rId6"/>
+    <p:sldId id="265" r:id="rId7"/>
+    <p:sldId id="266" r:id="rId8"/>
+    <p:sldId id="267" r:id="rId9"/>
+    <p:sldId id="268" r:id="rId10"/>
+    <p:sldId id="269" r:id="rId11"/>
+    <p:sldId id="270" r:id="rId12"/>
+    <p:sldId id="271" r:id="rId13"/>
+    <p:sldId id="272" r:id="rId14"/>
+    <p:sldId id="273" r:id="rId15"/>
+    <p:sldId id="275" r:id="rId16"/>
+    <p:sldId id="276" r:id="rId17"/>
+    <p:sldId id="277" r:id="rId18"/>
+    <p:sldId id="274" r:id="rId19"/>
+    <p:sldId id="278" r:id="rId20"/>
+    <p:sldId id="279" r:id="rId21"/>
+    <p:sldId id="280" r:id="rId22"/>
+    <p:sldId id="281" r:id="rId23"/>
   </p:sldIdLst>
   <p:sldSz cx="12192000" cy="6858000"/>
   <p:notesSz cx="6858000" cy="9144000"/>
@@ -213,7 +218,7 @@
           <a:p>
             <a:fld id="{D212E259-F3DF-4B20-A6F7-DD0F3F5F044C}" type="datetimeFigureOut">
               <a:rPr lang="en-US" smtClean="0"/>
-              <a:t>5/23/2023</a:t>
+              <a:t>8/7/2023</a:t>
             </a:fld>
             <a:endParaRPr lang="en-US"/>
           </a:p>
@@ -27209,563 +27214,6 @@
       </p:grpSpPr>
       <p:sp>
         <p:nvSpPr>
-          <p:cNvPr id="2" name="Title 1">
-            <a:extLst>
-              <a:ext uri="{FF2B5EF4-FFF2-40B4-BE49-F238E27FC236}">
-                <a16:creationId xmlns:a16="http://schemas.microsoft.com/office/drawing/2014/main" id="{A05F68E3-B9B8-2A58-DD21-F2C2E665ED15}"/>
-              </a:ext>
-            </a:extLst>
-          </p:cNvPr>
-          <p:cNvSpPr>
-            <a:spLocks noGrp="1"/>
-          </p:cNvSpPr>
-          <p:nvPr>
-            <p:ph type="title"/>
-          </p:nvPr>
-        </p:nvSpPr>
-        <p:spPr>
-          <a:xfrm>
-            <a:off x="609600" y="807467"/>
-            <a:ext cx="11109820" cy="668995"/>
-          </a:xfrm>
-        </p:spPr>
-        <p:txBody>
-          <a:bodyPr/>
-          <a:lstStyle/>
-          <a:p>
-            <a:r>
-              <a:rPr lang="en-US" dirty="0"/>
-              <a:t>Introduction to the  .NET Framework</a:t>
-            </a:r>
-          </a:p>
-        </p:txBody>
-      </p:sp>
-      <p:sp>
-        <p:nvSpPr>
-          <p:cNvPr id="3" name="Text Placeholder 2">
-            <a:extLst>
-              <a:ext uri="{FF2B5EF4-FFF2-40B4-BE49-F238E27FC236}">
-                <a16:creationId xmlns:a16="http://schemas.microsoft.com/office/drawing/2014/main" id="{F6501655-68EE-EF22-94CF-111088B41AEA}"/>
-              </a:ext>
-            </a:extLst>
-          </p:cNvPr>
-          <p:cNvSpPr>
-            <a:spLocks noGrp="1"/>
-          </p:cNvSpPr>
-          <p:nvPr>
-            <p:ph type="body" idx="1"/>
-          </p:nvPr>
-        </p:nvSpPr>
-        <p:spPr>
-          <a:xfrm>
-            <a:off x="609600" y="2382472"/>
-            <a:ext cx="11227266" cy="4085439"/>
-          </a:xfrm>
-        </p:spPr>
-        <p:txBody>
-          <a:bodyPr/>
-          <a:lstStyle/>
-          <a:p>
-            <a:pPr marL="152396" indent="0">
-              <a:buNone/>
-            </a:pPr>
-            <a:r>
-              <a:rPr lang="en-US" sz="1800" b="1" i="0" dirty="0">
-                <a:solidFill>
-                  <a:srgbClr val="000000"/>
-                </a:solidFill>
-                <a:effectLst/>
-                <a:latin typeface="arial" panose="020B0604020202020204" pitchFamily="34" charset="0"/>
-              </a:rPr>
-              <a:t>NET</a:t>
-            </a:r>
-            <a:r>
-              <a:rPr lang="en-US" sz="1800" b="0" i="0" dirty="0">
-                <a:solidFill>
-                  <a:srgbClr val="000000"/>
-                </a:solidFill>
-                <a:effectLst/>
-                <a:latin typeface="arial" panose="020B0604020202020204" pitchFamily="34" charset="0"/>
-              </a:rPr>
-              <a:t> stands for </a:t>
-            </a:r>
-            <a:r>
-              <a:rPr lang="en-US" sz="1800" b="1" i="0" dirty="0">
-                <a:solidFill>
-                  <a:srgbClr val="000000"/>
-                </a:solidFill>
-                <a:effectLst/>
-                <a:latin typeface="arial" panose="020B0604020202020204" pitchFamily="34" charset="0"/>
-              </a:rPr>
-              <a:t>Network Enabled Technology</a:t>
-            </a:r>
-            <a:r>
-              <a:rPr lang="en-US" sz="1800" b="0" i="0" dirty="0">
-                <a:solidFill>
-                  <a:srgbClr val="000000"/>
-                </a:solidFill>
-                <a:effectLst/>
-                <a:latin typeface="arial" panose="020B0604020202020204" pitchFamily="34" charset="0"/>
-              </a:rPr>
-              <a:t> (Internet). In .NET, dot (.) refers to </a:t>
-            </a:r>
-            <a:r>
-              <a:rPr lang="en-US" sz="1800" b="1" i="0" dirty="0">
-                <a:solidFill>
-                  <a:srgbClr val="000000"/>
-                </a:solidFill>
-                <a:effectLst/>
-                <a:latin typeface="arial" panose="020B0604020202020204" pitchFamily="34" charset="0"/>
-              </a:rPr>
-              <a:t>Object-Oriented,</a:t>
-            </a:r>
-            <a:r>
-              <a:rPr lang="en-US" sz="1800" b="0" i="0" dirty="0">
-                <a:solidFill>
-                  <a:srgbClr val="000000"/>
-                </a:solidFill>
-                <a:effectLst/>
-                <a:latin typeface="arial" panose="020B0604020202020204" pitchFamily="34" charset="0"/>
-              </a:rPr>
-              <a:t> and NET refers to the internet. So, the complete .NET means through Object-Oriented we can implement internet-based applications.</a:t>
-            </a:r>
-          </a:p>
-          <a:p>
-            <a:pPr marL="152396" indent="0">
-              <a:buNone/>
-            </a:pPr>
-            <a:r>
-              <a:rPr lang="en-US" sz="1800" dirty="0"/>
-              <a:t>According to Microsoft, .NET is a Free, Cross-Platform, Open-Source developer platform for building many different types of applications. With .NET, we can use multiple languages (C#, VB, F#, etc.), Editors (Visual Studio, Visual Studio Code, Visual Studio for Mac, OmniSharp, JetBrains Rider, etc.), and Libraries to build for Web, Mobile, Desktop, Games, IoT, and more.</a:t>
-            </a:r>
-          </a:p>
-          <a:p>
-            <a:pPr marL="152396" indent="0">
-              <a:buNone/>
-            </a:pPr>
-            <a:r>
-              <a:rPr lang="en-US" sz="1800" dirty="0"/>
-              <a:t>Cross Platform: Whether you are working in C#, F#, or Visual Basic, your code will run on any compatible operating system. You can build many types of apps with .NET. Some are Cross-Platform, and some target a specific set of operating systems and devices.</a:t>
-            </a:r>
-          </a:p>
-          <a:p>
-            <a:pPr marL="152396" indent="0">
-              <a:buNone/>
-            </a:pPr>
-            <a:r>
-              <a:rPr lang="en-US" sz="1800" dirty="0"/>
-              <a:t>Libraries: To extend functionality, Microsoft and others maintain a healthy .NET package ecosystem. </a:t>
-            </a:r>
-            <a:r>
-              <a:rPr lang="en-US" sz="1800" b="1" dirty="0"/>
-              <a:t>NuGet</a:t>
-            </a:r>
-            <a:r>
-              <a:rPr lang="en-US" sz="1800" dirty="0"/>
-              <a:t> is a package manager built specifically for .NET that contains over 100,000 packages.</a:t>
-            </a:r>
-          </a:p>
-        </p:txBody>
-      </p:sp>
-    </p:spTree>
-    <p:extLst>
-      <p:ext uri="{BB962C8B-B14F-4D97-AF65-F5344CB8AC3E}">
-        <p14:creationId xmlns:p14="http://schemas.microsoft.com/office/powerpoint/2010/main" val="2998746075"/>
-      </p:ext>
-    </p:extLst>
-  </p:cSld>
-  <p:clrMapOvr>
-    <a:masterClrMapping/>
-  </p:clrMapOvr>
-</p:sld>
-</file>
-
-<file path=ppt/slides/slide11.xml><?xml version="1.0" encoding="utf-8"?>
-<p:sld xmlns:a="http://schemas.openxmlformats.org/drawingml/2006/main" xmlns:r="http://schemas.openxmlformats.org/officeDocument/2006/relationships" xmlns:p="http://schemas.openxmlformats.org/presentationml/2006/main">
-  <p:cSld>
-    <p:spTree>
-      <p:nvGrpSpPr>
-        <p:cNvPr id="1" name=""/>
-        <p:cNvGrpSpPr/>
-        <p:nvPr/>
-      </p:nvGrpSpPr>
-      <p:grpSpPr>
-        <a:xfrm>
-          <a:off x="0" y="0"/>
-          <a:ext cx="0" cy="0"/>
-          <a:chOff x="0" y="0"/>
-          <a:chExt cx="0" cy="0"/>
-        </a:xfrm>
-      </p:grpSpPr>
-      <p:sp>
-        <p:nvSpPr>
-          <p:cNvPr id="2" name="Title 1">
-            <a:extLst>
-              <a:ext uri="{FF2B5EF4-FFF2-40B4-BE49-F238E27FC236}">
-                <a16:creationId xmlns:a16="http://schemas.microsoft.com/office/drawing/2014/main" id="{CF74EB80-DA55-E5E0-A980-E8BCCEC1A376}"/>
-              </a:ext>
-            </a:extLst>
-          </p:cNvPr>
-          <p:cNvSpPr>
-            <a:spLocks noGrp="1"/>
-          </p:cNvSpPr>
-          <p:nvPr>
-            <p:ph type="title"/>
-          </p:nvPr>
-        </p:nvSpPr>
-        <p:spPr>
-          <a:xfrm>
-            <a:off x="662730" y="379629"/>
-            <a:ext cx="10981189" cy="643828"/>
-          </a:xfrm>
-        </p:spPr>
-        <p:txBody>
-          <a:bodyPr/>
-          <a:lstStyle/>
-          <a:p>
-            <a:r>
-              <a:rPr lang="en-US" dirty="0"/>
-              <a:t>What Does the .NET Framework Provide</a:t>
-            </a:r>
-          </a:p>
-        </p:txBody>
-      </p:sp>
-      <p:sp>
-        <p:nvSpPr>
-          <p:cNvPr id="3" name="Text Placeholder 2">
-            <a:extLst>
-              <a:ext uri="{FF2B5EF4-FFF2-40B4-BE49-F238E27FC236}">
-                <a16:creationId xmlns:a16="http://schemas.microsoft.com/office/drawing/2014/main" id="{5E85B5D1-1D9F-5FE9-0C45-F9AAB8C8FDDB}"/>
-              </a:ext>
-            </a:extLst>
-          </p:cNvPr>
-          <p:cNvSpPr>
-            <a:spLocks noGrp="1"/>
-          </p:cNvSpPr>
-          <p:nvPr>
-            <p:ph type="body" idx="1"/>
-          </p:nvPr>
-        </p:nvSpPr>
-        <p:spPr>
-          <a:xfrm>
-            <a:off x="609599" y="1132514"/>
-            <a:ext cx="11034319" cy="5049686"/>
-          </a:xfrm>
-        </p:spPr>
-        <p:txBody>
-          <a:bodyPr/>
-          <a:lstStyle/>
-          <a:p>
-            <a:pPr marL="152396" indent="0">
-              <a:buNone/>
-            </a:pPr>
-            <a:r>
-              <a:rPr lang="en-US" dirty="0"/>
-              <a:t>The .NET framework provides two component:</a:t>
-            </a:r>
-          </a:p>
-          <a:p>
-            <a:pPr marL="152396" indent="0">
-              <a:buNone/>
-            </a:pPr>
-            <a:endParaRPr lang="en-US" dirty="0"/>
-          </a:p>
-          <a:p>
-            <a:r>
-              <a:rPr lang="en-US" dirty="0"/>
-              <a:t>BCL (Base Class Libraries)</a:t>
-            </a:r>
-          </a:p>
-          <a:p>
-            <a:r>
-              <a:rPr lang="en-US" dirty="0"/>
-              <a:t>CLR (Common Language Runtime)</a:t>
-            </a:r>
-          </a:p>
-          <a:p>
-            <a:pPr marL="152396" indent="0">
-              <a:buNone/>
-            </a:pPr>
-            <a:r>
-              <a:rPr lang="en-US" b="1" dirty="0"/>
-              <a:t>What is BCL</a:t>
-            </a:r>
-          </a:p>
-          <a:p>
-            <a:pPr marL="152396" indent="0">
-              <a:buNone/>
-            </a:pPr>
-            <a:r>
-              <a:rPr lang="en-US" dirty="0"/>
-              <a:t>The Base Class Library  is installed </a:t>
-            </a:r>
-            <a:r>
-              <a:rPr lang="en-US" dirty="0" err="1"/>
-              <a:t>ehen</a:t>
-            </a:r>
-            <a:r>
-              <a:rPr lang="en-US" dirty="0"/>
-              <a:t> we install the .NET framework . It provides a set of API’s and types for common functionality e.g. types for string, date, numbers</a:t>
-            </a:r>
-          </a:p>
-          <a:p>
-            <a:pPr marL="152396" indent="0">
-              <a:buNone/>
-            </a:pPr>
-            <a:r>
-              <a:rPr lang="en-US" dirty="0"/>
-              <a:t>BCL is a collection of pre-written code that provides many useful tools and building blocks form programmers when they are building their programs . </a:t>
-            </a:r>
-          </a:p>
-          <a:p>
-            <a:pPr marL="152396" indent="0">
-              <a:buNone/>
-            </a:pPr>
-            <a:r>
-              <a:rPr lang="en-US" dirty="0"/>
-              <a:t>(toybox)</a:t>
-            </a:r>
-          </a:p>
-        </p:txBody>
-      </p:sp>
-    </p:spTree>
-    <p:extLst>
-      <p:ext uri="{BB962C8B-B14F-4D97-AF65-F5344CB8AC3E}">
-        <p14:creationId xmlns:p14="http://schemas.microsoft.com/office/powerpoint/2010/main" val="2421184755"/>
-      </p:ext>
-    </p:extLst>
-  </p:cSld>
-  <p:clrMapOvr>
-    <a:masterClrMapping/>
-  </p:clrMapOvr>
-</p:sld>
-</file>
-
-<file path=ppt/slides/slide12.xml><?xml version="1.0" encoding="utf-8"?>
-<p:sld xmlns:a="http://schemas.openxmlformats.org/drawingml/2006/main" xmlns:r="http://schemas.openxmlformats.org/officeDocument/2006/relationships" xmlns:p="http://schemas.openxmlformats.org/presentationml/2006/main">
-  <p:cSld>
-    <p:spTree>
-      <p:nvGrpSpPr>
-        <p:cNvPr id="1" name=""/>
-        <p:cNvGrpSpPr/>
-        <p:nvPr/>
-      </p:nvGrpSpPr>
-      <p:grpSpPr>
-        <a:xfrm>
-          <a:off x="0" y="0"/>
-          <a:ext cx="0" cy="0"/>
-          <a:chOff x="0" y="0"/>
-          <a:chExt cx="0" cy="0"/>
-        </a:xfrm>
-      </p:grpSpPr>
-      <p:sp>
-        <p:nvSpPr>
-          <p:cNvPr id="3" name="Text Placeholder 2">
-            <a:extLst>
-              <a:ext uri="{FF2B5EF4-FFF2-40B4-BE49-F238E27FC236}">
-                <a16:creationId xmlns:a16="http://schemas.microsoft.com/office/drawing/2014/main" id="{AAA7E257-9CF8-C86A-EC8D-FA54DFC69DB0}"/>
-              </a:ext>
-            </a:extLst>
-          </p:cNvPr>
-          <p:cNvSpPr>
-            <a:spLocks noGrp="1"/>
-          </p:cNvSpPr>
-          <p:nvPr>
-            <p:ph type="body" idx="1"/>
-          </p:nvPr>
-        </p:nvSpPr>
-        <p:spPr>
-          <a:xfrm>
-            <a:off x="609600" y="570451"/>
-            <a:ext cx="11227266" cy="5998129"/>
-          </a:xfrm>
-        </p:spPr>
-        <p:txBody>
-          <a:bodyPr/>
-          <a:lstStyle/>
-          <a:p>
-            <a:pPr marL="152396" indent="0">
-              <a:buNone/>
-            </a:pPr>
-            <a:r>
-              <a:rPr lang="en-US" b="1" dirty="0"/>
-              <a:t>What is the CLR</a:t>
-            </a:r>
-          </a:p>
-          <a:p>
-            <a:pPr marL="152396" indent="0">
-              <a:buNone/>
-            </a:pPr>
-            <a:r>
-              <a:rPr lang="en-US" dirty="0"/>
-              <a:t>CLR is the execution engine that handles running applications, it provides services like garbage collection, treading , exception handling and more.</a:t>
-            </a:r>
-          </a:p>
-          <a:p>
-            <a:pPr marL="152396" indent="0">
-              <a:buNone/>
-            </a:pPr>
-            <a:r>
-              <a:rPr lang="en-US" dirty="0"/>
-              <a:t>Its main work is to ensure that the programs you write in the .NET framework works properly.( babysitter) </a:t>
-            </a:r>
-          </a:p>
-          <a:p>
-            <a:pPr marL="152396" indent="0" algn="l">
-              <a:buNone/>
-            </a:pPr>
-            <a:r>
-              <a:rPr lang="en-US" b="0" i="0" dirty="0">
-                <a:effectLst/>
-                <a:latin typeface="source-serif-pro"/>
-              </a:rPr>
-              <a:t>CLR Consist of a JIT compiler which is responsible for executing the Intermediate Code into Byte Code.</a:t>
-            </a:r>
-          </a:p>
-          <a:p>
-            <a:pPr marL="152396" indent="0" algn="l">
-              <a:buNone/>
-            </a:pPr>
-            <a:r>
-              <a:rPr lang="en-US" b="0" i="0" dirty="0">
-                <a:effectLst/>
-                <a:latin typeface="source-serif-pro"/>
-              </a:rPr>
-              <a:t>The garbage collector manages the allocation and release of memory for an application. Therefore, developers working with managed code don’t have to write code to perform memory management tasks. Automatic memory management can eliminate common problems such as forgetting to free an object and causing a memory leak or attempting to access freed memory for an object that’s already been freed.</a:t>
-            </a:r>
-          </a:p>
-          <a:p>
-            <a:pPr marL="152396" indent="0">
-              <a:buNone/>
-            </a:pPr>
-            <a:endParaRPr lang="en-US" dirty="0"/>
-          </a:p>
-        </p:txBody>
-      </p:sp>
-    </p:spTree>
-    <p:extLst>
-      <p:ext uri="{BB962C8B-B14F-4D97-AF65-F5344CB8AC3E}">
-        <p14:creationId xmlns:p14="http://schemas.microsoft.com/office/powerpoint/2010/main" val="3052792063"/>
-      </p:ext>
-    </p:extLst>
-  </p:cSld>
-  <p:clrMapOvr>
-    <a:masterClrMapping/>
-  </p:clrMapOvr>
-</p:sld>
-</file>
-
-<file path=ppt/slides/slide13.xml><?xml version="1.0" encoding="utf-8"?>
-<p:sld xmlns:a="http://schemas.openxmlformats.org/drawingml/2006/main" xmlns:r="http://schemas.openxmlformats.org/officeDocument/2006/relationships" xmlns:p="http://schemas.openxmlformats.org/presentationml/2006/main">
-  <p:cSld>
-    <p:spTree>
-      <p:nvGrpSpPr>
-        <p:cNvPr id="1" name=""/>
-        <p:cNvGrpSpPr/>
-        <p:nvPr/>
-      </p:nvGrpSpPr>
-      <p:grpSpPr>
-        <a:xfrm>
-          <a:off x="0" y="0"/>
-          <a:ext cx="0" cy="0"/>
-          <a:chOff x="0" y="0"/>
-          <a:chExt cx="0" cy="0"/>
-        </a:xfrm>
-      </p:grpSpPr>
-      <p:sp>
-        <p:nvSpPr>
-          <p:cNvPr id="2" name="Title 1">
-            <a:extLst>
-              <a:ext uri="{FF2B5EF4-FFF2-40B4-BE49-F238E27FC236}">
-                <a16:creationId xmlns:a16="http://schemas.microsoft.com/office/drawing/2014/main" id="{A6E057E5-8A64-538B-DF66-3625C40B9CC0}"/>
-              </a:ext>
-            </a:extLst>
-          </p:cNvPr>
-          <p:cNvSpPr>
-            <a:spLocks noGrp="1"/>
-          </p:cNvSpPr>
-          <p:nvPr>
-            <p:ph type="title"/>
-          </p:nvPr>
-        </p:nvSpPr>
-        <p:spPr>
-          <a:xfrm>
-            <a:off x="609600" y="807467"/>
-            <a:ext cx="8718958" cy="509605"/>
-          </a:xfrm>
-        </p:spPr>
-        <p:txBody>
-          <a:bodyPr/>
-          <a:lstStyle/>
-          <a:p>
-            <a:r>
-              <a:rPr lang="en-US" dirty="0"/>
-              <a:t>C# Code Compilation and Execution</a:t>
-            </a:r>
-          </a:p>
-        </p:txBody>
-      </p:sp>
-      <p:pic>
-        <p:nvPicPr>
-          <p:cNvPr id="5" name="Picture 4">
-            <a:extLst>
-              <a:ext uri="{FF2B5EF4-FFF2-40B4-BE49-F238E27FC236}">
-                <a16:creationId xmlns:a16="http://schemas.microsoft.com/office/drawing/2014/main" id="{A4C6C5C8-E7A4-E22E-0A05-4396C752E70C}"/>
-              </a:ext>
-            </a:extLst>
-          </p:cNvPr>
-          <p:cNvPicPr>
-            <a:picLocks noChangeAspect="1"/>
-          </p:cNvPicPr>
-          <p:nvPr/>
-        </p:nvPicPr>
-        <p:blipFill rotWithShape="1">
-          <a:blip r:embed="rId2"/>
-          <a:srcRect t="1238"/>
-          <a:stretch/>
-        </p:blipFill>
-        <p:spPr>
-          <a:xfrm>
-            <a:off x="1946245" y="1853966"/>
-            <a:ext cx="4697529" cy="4366469"/>
-          </a:xfrm>
-          <a:prstGeom prst="rect">
-            <a:avLst/>
-          </a:prstGeom>
-        </p:spPr>
-      </p:pic>
-    </p:spTree>
-    <p:extLst>
-      <p:ext uri="{BB962C8B-B14F-4D97-AF65-F5344CB8AC3E}">
-        <p14:creationId xmlns:p14="http://schemas.microsoft.com/office/powerpoint/2010/main" val="3624221266"/>
-      </p:ext>
-    </p:extLst>
-  </p:cSld>
-  <p:clrMapOvr>
-    <a:masterClrMapping/>
-  </p:clrMapOvr>
-</p:sld>
-</file>
-
-<file path=ppt/slides/slide14.xml><?xml version="1.0" encoding="utf-8"?>
-<p:sld xmlns:a="http://schemas.openxmlformats.org/drawingml/2006/main" xmlns:r="http://schemas.openxmlformats.org/officeDocument/2006/relationships" xmlns:p="http://schemas.openxmlformats.org/presentationml/2006/main">
-  <p:cSld>
-    <p:spTree>
-      <p:nvGrpSpPr>
-        <p:cNvPr id="1" name=""/>
-        <p:cNvGrpSpPr/>
-        <p:nvPr/>
-      </p:nvGrpSpPr>
-      <p:grpSpPr>
-        <a:xfrm>
-          <a:off x="0" y="0"/>
-          <a:ext cx="0" cy="0"/>
-          <a:chOff x="0" y="0"/>
-          <a:chExt cx="0" cy="0"/>
-        </a:xfrm>
-      </p:grpSpPr>
-      <p:sp>
-        <p:nvSpPr>
           <p:cNvPr id="3" name="Text Placeholder 2">
             <a:extLst>
               <a:ext uri="{FF2B5EF4-FFF2-40B4-BE49-F238E27FC236}">
@@ -27867,7 +27315,7 @@
 </p:sld>
 </file>
 
-<file path=ppt/slides/slide15.xml><?xml version="1.0" encoding="utf-8"?>
+<file path=ppt/slides/slide11.xml><?xml version="1.0" encoding="utf-8"?>
 <p:sld xmlns:a="http://schemas.openxmlformats.org/drawingml/2006/main" xmlns:r="http://schemas.openxmlformats.org/officeDocument/2006/relationships" xmlns:p="http://schemas.openxmlformats.org/presentationml/2006/main">
   <p:cSld>
     <p:spTree>
@@ -28048,7 +27496,7 @@
 </p:sld>
 </file>
 
-<file path=ppt/slides/slide16.xml><?xml version="1.0" encoding="utf-8"?>
+<file path=ppt/slides/slide12.xml><?xml version="1.0" encoding="utf-8"?>
 <p:sld xmlns:a="http://schemas.openxmlformats.org/drawingml/2006/main" xmlns:r="http://schemas.openxmlformats.org/officeDocument/2006/relationships" xmlns:p="http://schemas.openxmlformats.org/presentationml/2006/main">
   <p:cSld>
     <p:spTree>
@@ -28168,7 +27616,7 @@
 </p:sld>
 </file>
 
-<file path=ppt/slides/slide17.xml><?xml version="1.0" encoding="utf-8"?>
+<file path=ppt/slides/slide13.xml><?xml version="1.0" encoding="utf-8"?>
 <p:sld xmlns:a="http://schemas.openxmlformats.org/drawingml/2006/main" xmlns:r="http://schemas.openxmlformats.org/officeDocument/2006/relationships" xmlns:p="http://schemas.openxmlformats.org/presentationml/2006/main">
   <p:cSld>
     <p:spTree>
@@ -28343,6 +27791,768 @@
 </p:sld>
 </file>
 
+<file path=ppt/slides/slide14.xml><?xml version="1.0" encoding="utf-8"?>
+<p:sld xmlns:a="http://schemas.openxmlformats.org/drawingml/2006/main" xmlns:r="http://schemas.openxmlformats.org/officeDocument/2006/relationships" xmlns:p="http://schemas.openxmlformats.org/presentationml/2006/main">
+  <p:cSld>
+    <p:spTree>
+      <p:nvGrpSpPr>
+        <p:cNvPr id="1" name=""/>
+        <p:cNvGrpSpPr/>
+        <p:nvPr/>
+      </p:nvGrpSpPr>
+      <p:grpSpPr>
+        <a:xfrm>
+          <a:off x="0" y="0"/>
+          <a:ext cx="0" cy="0"/>
+          <a:chOff x="0" y="0"/>
+          <a:chExt cx="0" cy="0"/>
+        </a:xfrm>
+      </p:grpSpPr>
+      <p:sp>
+        <p:nvSpPr>
+          <p:cNvPr id="2" name="Title 1">
+            <a:extLst>
+              <a:ext uri="{FF2B5EF4-FFF2-40B4-BE49-F238E27FC236}">
+                <a16:creationId xmlns:a16="http://schemas.microsoft.com/office/drawing/2014/main" id="{93AAFD06-0D7B-2F11-E272-1C8383476237}"/>
+              </a:ext>
+            </a:extLst>
+          </p:cNvPr>
+          <p:cNvSpPr>
+            <a:spLocks noGrp="1"/>
+          </p:cNvSpPr>
+          <p:nvPr>
+            <p:ph type="title"/>
+          </p:nvPr>
+        </p:nvSpPr>
+        <p:spPr/>
+        <p:txBody>
+          <a:bodyPr/>
+          <a:lstStyle/>
+          <a:p>
+            <a:r>
+              <a:rPr lang="en-US" dirty="0"/>
+              <a:t>History Time</a:t>
+            </a:r>
+          </a:p>
+        </p:txBody>
+      </p:sp>
+      <p:sp>
+        <p:nvSpPr>
+          <p:cNvPr id="3" name="Text Placeholder 2">
+            <a:extLst>
+              <a:ext uri="{FF2B5EF4-FFF2-40B4-BE49-F238E27FC236}">
+                <a16:creationId xmlns:a16="http://schemas.microsoft.com/office/drawing/2014/main" id="{3468B719-1855-26EB-1781-C7C6DE813841}"/>
+              </a:ext>
+            </a:extLst>
+          </p:cNvPr>
+          <p:cNvSpPr>
+            <a:spLocks noGrp="1"/>
+          </p:cNvSpPr>
+          <p:nvPr>
+            <p:ph type="body" idx="1"/>
+          </p:nvPr>
+        </p:nvSpPr>
+        <p:spPr>
+          <a:xfrm>
+            <a:off x="609599" y="1610685"/>
+            <a:ext cx="11168543" cy="4915949"/>
+          </a:xfrm>
+        </p:spPr>
+        <p:txBody>
+          <a:bodyPr/>
+          <a:lstStyle/>
+          <a:p>
+            <a:r>
+              <a:rPr lang="en-US" dirty="0"/>
+              <a:t>Before C# there were tow languages in the C family :c and </a:t>
+            </a:r>
+            <a:r>
+              <a:rPr lang="en-US" dirty="0" err="1"/>
+              <a:t>c++</a:t>
+            </a:r>
+            <a:r>
+              <a:rPr lang="en-US" dirty="0"/>
+              <a:t>.</a:t>
+            </a:r>
+          </a:p>
+          <a:p>
+            <a:r>
+              <a:rPr lang="en-US" dirty="0"/>
+              <a:t>When we compiled code with any of the above the compiler compiled our code to native code for the machine its running on e.g.(windows or macOS)</a:t>
+            </a:r>
+          </a:p>
+          <a:p>
+            <a:r>
+              <a:rPr lang="en-US" dirty="0"/>
+              <a:t>But we have different hardware's , and that means that the above wont be possible.</a:t>
+            </a:r>
+          </a:p>
+          <a:p>
+            <a:r>
+              <a:rPr lang="en-US" dirty="0"/>
+              <a:t>C# however changed that </a:t>
+            </a:r>
+          </a:p>
+        </p:txBody>
+      </p:sp>
+    </p:spTree>
+    <p:extLst>
+      <p:ext uri="{BB962C8B-B14F-4D97-AF65-F5344CB8AC3E}">
+        <p14:creationId xmlns:p14="http://schemas.microsoft.com/office/powerpoint/2010/main" val="2430405489"/>
+      </p:ext>
+    </p:extLst>
+  </p:cSld>
+  <p:clrMapOvr>
+    <a:masterClrMapping/>
+  </p:clrMapOvr>
+</p:sld>
+</file>
+
+<file path=ppt/slides/slide15.xml><?xml version="1.0" encoding="utf-8"?>
+<p:sld xmlns:a="http://schemas.openxmlformats.org/drawingml/2006/main" xmlns:r="http://schemas.openxmlformats.org/officeDocument/2006/relationships" xmlns:p="http://schemas.openxmlformats.org/presentationml/2006/main">
+  <p:cSld>
+    <p:spTree>
+      <p:nvGrpSpPr>
+        <p:cNvPr id="1" name=""/>
+        <p:cNvGrpSpPr/>
+        <p:nvPr/>
+      </p:nvGrpSpPr>
+      <p:grpSpPr>
+        <a:xfrm>
+          <a:off x="0" y="0"/>
+          <a:ext cx="0" cy="0"/>
+          <a:chOff x="0" y="0"/>
+          <a:chExt cx="0" cy="0"/>
+        </a:xfrm>
+      </p:grpSpPr>
+      <p:pic>
+        <p:nvPicPr>
+          <p:cNvPr id="5" name="Picture 4">
+            <a:extLst>
+              <a:ext uri="{FF2B5EF4-FFF2-40B4-BE49-F238E27FC236}">
+                <a16:creationId xmlns:a16="http://schemas.microsoft.com/office/drawing/2014/main" id="{143ABB36-5655-10E5-D796-1F97008D14C3}"/>
+              </a:ext>
+            </a:extLst>
+          </p:cNvPr>
+          <p:cNvPicPr>
+            <a:picLocks noChangeAspect="1"/>
+          </p:cNvPicPr>
+          <p:nvPr/>
+        </p:nvPicPr>
+        <p:blipFill>
+          <a:blip r:embed="rId2"/>
+          <a:stretch>
+            <a:fillRect/>
+          </a:stretch>
+        </p:blipFill>
+        <p:spPr>
+          <a:xfrm>
+            <a:off x="425341" y="83127"/>
+            <a:ext cx="6907864" cy="3074894"/>
+          </a:xfrm>
+          <a:prstGeom prst="rect">
+            <a:avLst/>
+          </a:prstGeom>
+        </p:spPr>
+      </p:pic>
+      <p:pic>
+        <p:nvPicPr>
+          <p:cNvPr id="7" name="Picture 6">
+            <a:extLst>
+              <a:ext uri="{FF2B5EF4-FFF2-40B4-BE49-F238E27FC236}">
+                <a16:creationId xmlns:a16="http://schemas.microsoft.com/office/drawing/2014/main" id="{CCA050E8-7083-B5C0-774C-31D0D94E8437}"/>
+              </a:ext>
+            </a:extLst>
+          </p:cNvPr>
+          <p:cNvPicPr>
+            <a:picLocks noChangeAspect="1"/>
+          </p:cNvPicPr>
+          <p:nvPr/>
+        </p:nvPicPr>
+        <p:blipFill>
+          <a:blip r:embed="rId3"/>
+          <a:stretch>
+            <a:fillRect/>
+          </a:stretch>
+        </p:blipFill>
+        <p:spPr>
+          <a:xfrm>
+            <a:off x="4757195" y="3205473"/>
+            <a:ext cx="6907863" cy="3569400"/>
+          </a:xfrm>
+          <a:prstGeom prst="rect">
+            <a:avLst/>
+          </a:prstGeom>
+        </p:spPr>
+      </p:pic>
+    </p:spTree>
+    <p:extLst>
+      <p:ext uri="{BB962C8B-B14F-4D97-AF65-F5344CB8AC3E}">
+        <p14:creationId xmlns:p14="http://schemas.microsoft.com/office/powerpoint/2010/main" val="867340885"/>
+      </p:ext>
+    </p:extLst>
+  </p:cSld>
+  <p:clrMapOvr>
+    <a:masterClrMapping/>
+  </p:clrMapOvr>
+</p:sld>
+</file>
+
+<file path=ppt/slides/slide16.xml><?xml version="1.0" encoding="utf-8"?>
+<p:sld xmlns:a="http://schemas.openxmlformats.org/drawingml/2006/main" xmlns:r="http://schemas.openxmlformats.org/officeDocument/2006/relationships" xmlns:p="http://schemas.openxmlformats.org/presentationml/2006/main">
+  <p:cSld>
+    <p:spTree>
+      <p:nvGrpSpPr>
+        <p:cNvPr id="1" name=""/>
+        <p:cNvGrpSpPr/>
+        <p:nvPr/>
+      </p:nvGrpSpPr>
+      <p:grpSpPr>
+        <a:xfrm>
+          <a:off x="0" y="0"/>
+          <a:ext cx="0" cy="0"/>
+          <a:chOff x="0" y="0"/>
+          <a:chExt cx="0" cy="0"/>
+        </a:xfrm>
+      </p:grpSpPr>
+      <p:pic>
+        <p:nvPicPr>
+          <p:cNvPr id="7" name="Picture 6">
+            <a:extLst>
+              <a:ext uri="{FF2B5EF4-FFF2-40B4-BE49-F238E27FC236}">
+                <a16:creationId xmlns:a16="http://schemas.microsoft.com/office/drawing/2014/main" id="{AFDC40C7-E162-41DC-C495-E6D231C7A298}"/>
+              </a:ext>
+            </a:extLst>
+          </p:cNvPr>
+          <p:cNvPicPr>
+            <a:picLocks noChangeAspect="1"/>
+          </p:cNvPicPr>
+          <p:nvPr/>
+        </p:nvPicPr>
+        <p:blipFill>
+          <a:blip r:embed="rId2"/>
+          <a:stretch>
+            <a:fillRect/>
+          </a:stretch>
+        </p:blipFill>
+        <p:spPr>
+          <a:xfrm>
+            <a:off x="568040" y="451823"/>
+            <a:ext cx="11055919" cy="6173421"/>
+          </a:xfrm>
+          <a:prstGeom prst="rect">
+            <a:avLst/>
+          </a:prstGeom>
+        </p:spPr>
+      </p:pic>
+    </p:spTree>
+    <p:extLst>
+      <p:ext uri="{BB962C8B-B14F-4D97-AF65-F5344CB8AC3E}">
+        <p14:creationId xmlns:p14="http://schemas.microsoft.com/office/powerpoint/2010/main" val="901997142"/>
+      </p:ext>
+    </p:extLst>
+  </p:cSld>
+  <p:clrMapOvr>
+    <a:masterClrMapping/>
+  </p:clrMapOvr>
+</p:sld>
+</file>
+
+<file path=ppt/slides/slide17.xml><?xml version="1.0" encoding="utf-8"?>
+<p:sld xmlns:a="http://schemas.openxmlformats.org/drawingml/2006/main" xmlns:r="http://schemas.openxmlformats.org/officeDocument/2006/relationships" xmlns:p="http://schemas.openxmlformats.org/presentationml/2006/main">
+  <p:cSld>
+    <p:spTree>
+      <p:nvGrpSpPr>
+        <p:cNvPr id="1" name=""/>
+        <p:cNvGrpSpPr/>
+        <p:nvPr/>
+      </p:nvGrpSpPr>
+      <p:grpSpPr>
+        <a:xfrm>
+          <a:off x="0" y="0"/>
+          <a:ext cx="0" cy="0"/>
+          <a:chOff x="0" y="0"/>
+          <a:chExt cx="0" cy="0"/>
+        </a:xfrm>
+      </p:grpSpPr>
+      <p:sp>
+        <p:nvSpPr>
+          <p:cNvPr id="2" name="Title 1">
+            <a:extLst>
+              <a:ext uri="{FF2B5EF4-FFF2-40B4-BE49-F238E27FC236}">
+                <a16:creationId xmlns:a16="http://schemas.microsoft.com/office/drawing/2014/main" id="{FF623AD3-EA56-871F-F631-A2AC88A6BBF9}"/>
+              </a:ext>
+            </a:extLst>
+          </p:cNvPr>
+          <p:cNvSpPr>
+            <a:spLocks noGrp="1"/>
+          </p:cNvSpPr>
+          <p:nvPr>
+            <p:ph type="title"/>
+          </p:nvPr>
+        </p:nvSpPr>
+        <p:spPr>
+          <a:xfrm>
+            <a:off x="609599" y="260620"/>
+            <a:ext cx="7808259" cy="716533"/>
+          </a:xfrm>
+        </p:spPr>
+        <p:txBody>
+          <a:bodyPr/>
+          <a:lstStyle/>
+          <a:p>
+            <a:r>
+              <a:rPr lang="en-US" dirty="0"/>
+              <a:t>Architecture of C# Application</a:t>
+            </a:r>
+          </a:p>
+        </p:txBody>
+      </p:sp>
+      <p:pic>
+        <p:nvPicPr>
+          <p:cNvPr id="5" name="Picture 4">
+            <a:extLst>
+              <a:ext uri="{FF2B5EF4-FFF2-40B4-BE49-F238E27FC236}">
+                <a16:creationId xmlns:a16="http://schemas.microsoft.com/office/drawing/2014/main" id="{46305127-8782-A65F-0DD6-169357F3D72C}"/>
+              </a:ext>
+            </a:extLst>
+          </p:cNvPr>
+          <p:cNvPicPr>
+            <a:picLocks noChangeAspect="1"/>
+          </p:cNvPicPr>
+          <p:nvPr/>
+        </p:nvPicPr>
+        <p:blipFill>
+          <a:blip r:embed="rId2"/>
+          <a:stretch>
+            <a:fillRect/>
+          </a:stretch>
+        </p:blipFill>
+        <p:spPr>
+          <a:xfrm>
+            <a:off x="1030787" y="821734"/>
+            <a:ext cx="4278959" cy="2256178"/>
+          </a:xfrm>
+          <a:prstGeom prst="rect">
+            <a:avLst/>
+          </a:prstGeom>
+        </p:spPr>
+      </p:pic>
+      <p:pic>
+        <p:nvPicPr>
+          <p:cNvPr id="9" name="Picture 8">
+            <a:extLst>
+              <a:ext uri="{FF2B5EF4-FFF2-40B4-BE49-F238E27FC236}">
+                <a16:creationId xmlns:a16="http://schemas.microsoft.com/office/drawing/2014/main" id="{6CBE1B8D-59C6-990E-2AAF-24CDA136BF70}"/>
+              </a:ext>
+            </a:extLst>
+          </p:cNvPr>
+          <p:cNvPicPr>
+            <a:picLocks noChangeAspect="1"/>
+          </p:cNvPicPr>
+          <p:nvPr/>
+        </p:nvPicPr>
+        <p:blipFill rotWithShape="1">
+          <a:blip r:embed="rId3"/>
+          <a:srcRect l="8208" t="9205" r="26119" b="10422"/>
+          <a:stretch/>
+        </p:blipFill>
+        <p:spPr>
+          <a:xfrm>
+            <a:off x="6959136" y="821734"/>
+            <a:ext cx="3301555" cy="2567889"/>
+          </a:xfrm>
+          <a:prstGeom prst="rect">
+            <a:avLst/>
+          </a:prstGeom>
+        </p:spPr>
+      </p:pic>
+      <p:pic>
+        <p:nvPicPr>
+          <p:cNvPr id="11" name="Picture 10">
+            <a:extLst>
+              <a:ext uri="{FF2B5EF4-FFF2-40B4-BE49-F238E27FC236}">
+                <a16:creationId xmlns:a16="http://schemas.microsoft.com/office/drawing/2014/main" id="{C19A1634-F964-CCA7-8CA4-EFF90177DFE3}"/>
+              </a:ext>
+            </a:extLst>
+          </p:cNvPr>
+          <p:cNvPicPr>
+            <a:picLocks noChangeAspect="1"/>
+          </p:cNvPicPr>
+          <p:nvPr/>
+        </p:nvPicPr>
+        <p:blipFill>
+          <a:blip r:embed="rId4"/>
+          <a:stretch>
+            <a:fillRect/>
+          </a:stretch>
+        </p:blipFill>
+        <p:spPr>
+          <a:xfrm>
+            <a:off x="707198" y="3165931"/>
+            <a:ext cx="4602547" cy="3288657"/>
+          </a:xfrm>
+          <a:prstGeom prst="rect">
+            <a:avLst/>
+          </a:prstGeom>
+        </p:spPr>
+      </p:pic>
+      <p:pic>
+        <p:nvPicPr>
+          <p:cNvPr id="13" name="Picture 12">
+            <a:extLst>
+              <a:ext uri="{FF2B5EF4-FFF2-40B4-BE49-F238E27FC236}">
+                <a16:creationId xmlns:a16="http://schemas.microsoft.com/office/drawing/2014/main" id="{DEEAB85A-1D44-29C9-8389-3912DBC028DF}"/>
+              </a:ext>
+            </a:extLst>
+          </p:cNvPr>
+          <p:cNvPicPr>
+            <a:picLocks noChangeAspect="1"/>
+          </p:cNvPicPr>
+          <p:nvPr/>
+        </p:nvPicPr>
+        <p:blipFill>
+          <a:blip r:embed="rId5"/>
+          <a:stretch>
+            <a:fillRect/>
+          </a:stretch>
+        </p:blipFill>
+        <p:spPr>
+          <a:xfrm>
+            <a:off x="6959136" y="3558824"/>
+            <a:ext cx="4278960" cy="2771733"/>
+          </a:xfrm>
+          <a:prstGeom prst="rect">
+            <a:avLst/>
+          </a:prstGeom>
+        </p:spPr>
+      </p:pic>
+    </p:spTree>
+    <p:extLst>
+      <p:ext uri="{BB962C8B-B14F-4D97-AF65-F5344CB8AC3E}">
+        <p14:creationId xmlns:p14="http://schemas.microsoft.com/office/powerpoint/2010/main" val="4119542094"/>
+      </p:ext>
+    </p:extLst>
+  </p:cSld>
+  <p:clrMapOvr>
+    <a:masterClrMapping/>
+  </p:clrMapOvr>
+</p:sld>
+</file>
+
+<file path=ppt/slides/slide18.xml><?xml version="1.0" encoding="utf-8"?>
+<p:sld xmlns:a="http://schemas.openxmlformats.org/drawingml/2006/main" xmlns:r="http://schemas.openxmlformats.org/officeDocument/2006/relationships" xmlns:p="http://schemas.openxmlformats.org/presentationml/2006/main">
+  <p:cSld>
+    <p:spTree>
+      <p:nvGrpSpPr>
+        <p:cNvPr id="1" name=""/>
+        <p:cNvGrpSpPr/>
+        <p:nvPr/>
+      </p:nvGrpSpPr>
+      <p:grpSpPr>
+        <a:xfrm>
+          <a:off x="0" y="0"/>
+          <a:ext cx="0" cy="0"/>
+          <a:chOff x="0" y="0"/>
+          <a:chExt cx="0" cy="0"/>
+        </a:xfrm>
+      </p:grpSpPr>
+      <p:sp>
+        <p:nvSpPr>
+          <p:cNvPr id="2" name="Title 1">
+            <a:extLst>
+              <a:ext uri="{FF2B5EF4-FFF2-40B4-BE49-F238E27FC236}">
+                <a16:creationId xmlns:a16="http://schemas.microsoft.com/office/drawing/2014/main" id="{02CD411C-C0B6-F3D2-90CD-C946AE3E2DD1}"/>
+              </a:ext>
+            </a:extLst>
+          </p:cNvPr>
+          <p:cNvSpPr>
+            <a:spLocks noGrp="1"/>
+          </p:cNvSpPr>
+          <p:nvPr>
+            <p:ph type="title"/>
+          </p:nvPr>
+        </p:nvSpPr>
+        <p:spPr>
+          <a:xfrm>
+            <a:off x="448235" y="277906"/>
+            <a:ext cx="7718612" cy="842682"/>
+          </a:xfrm>
+        </p:spPr>
+        <p:txBody>
+          <a:bodyPr/>
+          <a:lstStyle/>
+          <a:p>
+            <a:r>
+              <a:rPr lang="en-US" dirty="0"/>
+              <a:t>Why C#</a:t>
+            </a:r>
+          </a:p>
+        </p:txBody>
+      </p:sp>
+      <p:sp>
+        <p:nvSpPr>
+          <p:cNvPr id="3" name="Text Placeholder 2">
+            <a:extLst>
+              <a:ext uri="{FF2B5EF4-FFF2-40B4-BE49-F238E27FC236}">
+                <a16:creationId xmlns:a16="http://schemas.microsoft.com/office/drawing/2014/main" id="{0EC7FC9F-ACC5-48EA-8229-48A7AEF0FACD}"/>
+              </a:ext>
+            </a:extLst>
+          </p:cNvPr>
+          <p:cNvSpPr>
+            <a:spLocks noGrp="1"/>
+          </p:cNvSpPr>
+          <p:nvPr>
+            <p:ph type="body" idx="1"/>
+          </p:nvPr>
+        </p:nvSpPr>
+        <p:spPr>
+          <a:xfrm>
+            <a:off x="143435" y="1398493"/>
+            <a:ext cx="11860305" cy="5369859"/>
+          </a:xfrm>
+        </p:spPr>
+        <p:txBody>
+          <a:bodyPr/>
+          <a:lstStyle/>
+          <a:p>
+            <a:pPr marL="152396" indent="0">
+              <a:buNone/>
+            </a:pPr>
+            <a:r>
+              <a:rPr lang="en-US" sz="1800" b="1" dirty="0"/>
+              <a:t>C# is Simple and Familiar:</a:t>
+            </a:r>
+          </a:p>
+          <a:p>
+            <a:pPr marL="152396" indent="0">
+              <a:buNone/>
+            </a:pPr>
+            <a:r>
+              <a:rPr lang="en-US" sz="1800" dirty="0"/>
+              <a:t>C# is simple because C# simplifies the programmer’s job by avoiding certain features of C and C++. C# avoids explicit memory management. Memory management in C# is automatic. It is done by CLR. So, there is no chance of memory leakage. There is a pointer concept in C# but it is restricted. C# is very familiar to programmers because it is modeled on the C and C++ languages. C# uses many features of C and C++; therefore, C# codes look like C and C++ codes. We can say C# is the simplified version of C and C++.</a:t>
+            </a:r>
+          </a:p>
+          <a:p>
+            <a:pPr marL="152396" indent="0">
+              <a:buNone/>
+            </a:pPr>
+            <a:r>
+              <a:rPr lang="en-US" sz="1800" b="1" dirty="0"/>
+              <a:t>C# is Portable:</a:t>
+            </a:r>
+          </a:p>
+          <a:p>
+            <a:pPr marL="152396" indent="0">
+              <a:buNone/>
+            </a:pPr>
+            <a:r>
+              <a:rPr lang="en-US" sz="1800" dirty="0"/>
+              <a:t>Portability allows the programmer to write the same code for different machines (operating systems). C# provides portability in two ways</a:t>
+            </a:r>
+          </a:p>
+          <a:p>
+            <a:pPr marL="152396" indent="0">
+              <a:buNone/>
+            </a:pPr>
+            <a:r>
+              <a:rPr lang="en-US" sz="1800" b="1" dirty="0"/>
+              <a:t>Source Code Portability</a:t>
+            </a:r>
+          </a:p>
+          <a:p>
+            <a:pPr marL="152396" indent="0">
+              <a:buNone/>
+            </a:pPr>
+            <a:r>
+              <a:rPr lang="en-US" sz="1800" dirty="0"/>
+              <a:t>IL Code Portability (DLL and EXE)</a:t>
+            </a:r>
+          </a:p>
+          <a:p>
+            <a:pPr marL="152396" indent="0">
+              <a:buNone/>
+            </a:pPr>
+            <a:r>
+              <a:rPr lang="en-US" sz="1800" dirty="0"/>
+              <a:t>In C#, we can write the source code in Multiple OS and get the output. Even though we can IL Code Portability is also available. So, once you have the DLL and EXE, then you can use those DLLs and EXEs on different OS and you can get the output as expected. Whereas in the case of C and C++ there is only source code portability.</a:t>
+            </a:r>
+          </a:p>
+          <a:p>
+            <a:pPr marL="152396" indent="0">
+              <a:buNone/>
+            </a:pPr>
+            <a:r>
+              <a:rPr lang="en-US" sz="1800" b="1" dirty="0"/>
+              <a:t>C# is Robust:</a:t>
+            </a:r>
+          </a:p>
+          <a:p>
+            <a:pPr marL="152396" indent="0">
+              <a:buNone/>
+            </a:pPr>
+            <a:r>
+              <a:rPr lang="en-US" sz="1800" dirty="0"/>
+              <a:t>Robust means Strong. C# is a strong type-checking language having strict type-checking during both compilation time and execution time which allows us to develop error-free applications and programs.</a:t>
+            </a:r>
+          </a:p>
+          <a:p>
+            <a:pPr marL="152396" indent="0">
+              <a:buNone/>
+            </a:pPr>
+            <a:endParaRPr lang="en-US" sz="1600" dirty="0"/>
+          </a:p>
+        </p:txBody>
+      </p:sp>
+    </p:spTree>
+    <p:extLst>
+      <p:ext uri="{BB962C8B-B14F-4D97-AF65-F5344CB8AC3E}">
+        <p14:creationId xmlns:p14="http://schemas.microsoft.com/office/powerpoint/2010/main" val="251105278"/>
+      </p:ext>
+    </p:extLst>
+  </p:cSld>
+  <p:clrMapOvr>
+    <a:masterClrMapping/>
+  </p:clrMapOvr>
+</p:sld>
+</file>
+
+<file path=ppt/slides/slide19.xml><?xml version="1.0" encoding="utf-8"?>
+<p:sld xmlns:a="http://schemas.openxmlformats.org/drawingml/2006/main" xmlns:r="http://schemas.openxmlformats.org/officeDocument/2006/relationships" xmlns:p="http://schemas.openxmlformats.org/presentationml/2006/main">
+  <p:cSld>
+    <p:spTree>
+      <p:nvGrpSpPr>
+        <p:cNvPr id="1" name=""/>
+        <p:cNvGrpSpPr/>
+        <p:nvPr/>
+      </p:nvGrpSpPr>
+      <p:grpSpPr>
+        <a:xfrm>
+          <a:off x="0" y="0"/>
+          <a:ext cx="0" cy="0"/>
+          <a:chOff x="0" y="0"/>
+          <a:chExt cx="0" cy="0"/>
+        </a:xfrm>
+      </p:grpSpPr>
+      <p:sp>
+        <p:nvSpPr>
+          <p:cNvPr id="3" name="Text Placeholder 2">
+            <a:extLst>
+              <a:ext uri="{FF2B5EF4-FFF2-40B4-BE49-F238E27FC236}">
+                <a16:creationId xmlns:a16="http://schemas.microsoft.com/office/drawing/2014/main" id="{88A1F75A-98F5-7FC8-3164-85DC845A92C9}"/>
+              </a:ext>
+            </a:extLst>
+          </p:cNvPr>
+          <p:cNvSpPr>
+            <a:spLocks noGrp="1"/>
+          </p:cNvSpPr>
+          <p:nvPr>
+            <p:ph type="body" idx="1"/>
+          </p:nvPr>
+        </p:nvSpPr>
+        <p:spPr>
+          <a:xfrm>
+            <a:off x="98612" y="143435"/>
+            <a:ext cx="12021670" cy="6714565"/>
+          </a:xfrm>
+        </p:spPr>
+        <p:txBody>
+          <a:bodyPr/>
+          <a:lstStyle/>
+          <a:p>
+            <a:pPr marL="152396" indent="0">
+              <a:buNone/>
+            </a:pPr>
+            <a:r>
+              <a:rPr lang="en-US" sz="2000" b="1" dirty="0"/>
+              <a:t>C# is Dynamic:</a:t>
+            </a:r>
+          </a:p>
+          <a:p>
+            <a:pPr marL="152396" indent="0">
+              <a:buNone/>
+            </a:pPr>
+            <a:r>
+              <a:rPr lang="en-US" sz="2000" dirty="0"/>
+              <a:t>C# 4.0 introduced a new type called dynamic that avoids compile-time type checking. A dynamic type escapes type checking at compile-time; instead, it resolves the type at run time. So, if you don’t know the type of data that you want to store, then you can use dynamic as the data type, and at runtime based on value or data, the type will automatically resolve. So, C# is dynamic.</a:t>
+            </a:r>
+          </a:p>
+          <a:p>
+            <a:pPr marL="152396" indent="0">
+              <a:buNone/>
+            </a:pPr>
+            <a:r>
+              <a:rPr lang="en-US" sz="2000" b="1" dirty="0"/>
+              <a:t>C# is Platform Independent:</a:t>
+            </a:r>
+          </a:p>
+          <a:p>
+            <a:pPr marL="152396" indent="0">
+              <a:buNone/>
+            </a:pPr>
+            <a:r>
+              <a:rPr lang="en-US" sz="2000" dirty="0"/>
+              <a:t>Many Programming Languages are compatible with only one platform. Now, with the introduction of .NET Core or .NET, C# was specifically designed to be platform-independent. C# applications with .NET Core or .NET can be run on Windows, Linux, and Mac operating systems. So, we can say C# is Platform Independent with .NET Core or .NET.</a:t>
+            </a:r>
+          </a:p>
+          <a:p>
+            <a:pPr marL="152396" indent="0">
+              <a:buNone/>
+            </a:pPr>
+            <a:r>
+              <a:rPr lang="en-US" sz="2000" b="1" dirty="0"/>
+              <a:t>C# is Multithreaded:</a:t>
+            </a:r>
+          </a:p>
+          <a:p>
+            <a:pPr marL="152396" indent="0">
+              <a:buNone/>
+            </a:pPr>
+            <a:r>
+              <a:rPr lang="en-US" sz="2000" dirty="0"/>
+              <a:t>A process is divided into several small parts known as threads or lightweight processes. Sending multiple threads to the processor for processing is known as multithreading. Multi-threading means handling multiple tasks simultaneously. For example, we can listen to music while scrolling a page and at the same time we can download an application from the internet on a computer. </a:t>
+            </a:r>
+          </a:p>
+          <a:p>
+            <a:pPr marL="152396" indent="0">
+              <a:buNone/>
+            </a:pPr>
+            <a:r>
+              <a:rPr lang="en-US" sz="2000" dirty="0"/>
+              <a:t>If multiple threads are used to execute your application code, then it is called Multithreading. Multithreading is a mechanism to implement Concurrent Programming where multiple threads execute the code simultaneously. And using C# Programming language we can develop multithread applications. So, C# supports multithreaded programming</a:t>
+            </a:r>
+            <a:r>
+              <a:rPr lang="en-US" sz="2400" dirty="0"/>
+              <a:t>.</a:t>
+            </a:r>
+          </a:p>
+          <a:p>
+            <a:pPr marL="152396" indent="0">
+              <a:buNone/>
+            </a:pPr>
+            <a:endParaRPr lang="en-US" sz="1600" dirty="0"/>
+          </a:p>
+          <a:p>
+            <a:pPr marL="152396" indent="0">
+              <a:buNone/>
+            </a:pPr>
+            <a:endParaRPr lang="en-US" sz="1800" dirty="0"/>
+          </a:p>
+        </p:txBody>
+      </p:sp>
+    </p:spTree>
+    <p:extLst>
+      <p:ext uri="{BB962C8B-B14F-4D97-AF65-F5344CB8AC3E}">
+        <p14:creationId xmlns:p14="http://schemas.microsoft.com/office/powerpoint/2010/main" val="925861198"/>
+      </p:ext>
+    </p:extLst>
+  </p:cSld>
+  <p:clrMapOvr>
+    <a:masterClrMapping/>
+  </p:clrMapOvr>
+</p:sld>
+</file>
+
 <file path=ppt/slides/slide2.xml><?xml version="1.0" encoding="utf-8"?>
 <p:sld xmlns:a="http://schemas.openxmlformats.org/drawingml/2006/main" xmlns:r="http://schemas.openxmlformats.org/officeDocument/2006/relationships" xmlns:p="http://schemas.openxmlformats.org/presentationml/2006/main">
   <p:cSld>
@@ -28413,8 +28623,8 @@
         </p:nvSpPr>
         <p:spPr bwMode="auto">
           <a:xfrm>
-            <a:off x="891046" y="1895549"/>
-            <a:ext cx="10576705" cy="4154984"/>
+            <a:off x="891046" y="2311047"/>
+            <a:ext cx="10576705" cy="3323987"/>
           </a:xfrm>
           <a:prstGeom prst="rect">
             <a:avLst/>
@@ -28523,52 +28733,6 @@
                 <a:cs typeface="Times New Roman"/>
               </a:rPr>
               <a:t>How computer programs Works</a:t>
-            </a:r>
-          </a:p>
-          <a:p>
-            <a:pPr marL="0" indent="0">
-              <a:lnSpc>
-                <a:spcPct val="150000"/>
-              </a:lnSpc>
-              <a:spcBef>
-                <a:spcPct val="0"/>
-              </a:spcBef>
-              <a:spcAft>
-                <a:spcPct val="0"/>
-              </a:spcAft>
-              <a:buSzTx/>
-              <a:buNone/>
-            </a:pPr>
-            <a:r>
-              <a:rPr lang="en-US" sz="1800" dirty="0">
-                <a:latin typeface="Times New Roman"/>
-                <a:ea typeface="Calibri" panose="020F0502020204030204" pitchFamily="34" charset="0"/>
-                <a:cs typeface="Times New Roman"/>
-              </a:rPr>
-              <a:t>Programming Methodologies</a:t>
-            </a:r>
-          </a:p>
-          <a:p>
-            <a:pPr marL="0" indent="0">
-              <a:lnSpc>
-                <a:spcPct val="150000"/>
-              </a:lnSpc>
-              <a:spcBef>
-                <a:spcPct val="0"/>
-              </a:spcBef>
-              <a:spcAft>
-                <a:spcPct val="0"/>
-              </a:spcAft>
-              <a:buSzTx/>
-              <a:buNone/>
-            </a:pPr>
-            <a:r>
-              <a:rPr lang="en-US" sz="1800" dirty="0">
-                <a:latin typeface="Times New Roman"/>
-                <a:ea typeface="Calibri" panose="020F0502020204030204" pitchFamily="34" charset="0"/>
-                <a:cs typeface="Times New Roman"/>
-              </a:rPr>
-              <a:t>Algorithm, Pseudocode, Programs and Flowcharts</a:t>
             </a:r>
           </a:p>
           <a:p>
@@ -28701,7 +28865,151 @@
 </p:sld>
 </file>
 
-<file path=ppt/slides/slide3.xml><?xml version="1.0" encoding="utf-8"?>
+<file path=ppt/slides/slide20.xml><?xml version="1.0" encoding="utf-8"?>
+<p:sld xmlns:a="http://schemas.openxmlformats.org/drawingml/2006/main" xmlns:r="http://schemas.openxmlformats.org/officeDocument/2006/relationships" xmlns:p="http://schemas.openxmlformats.org/presentationml/2006/main">
+  <p:cSld>
+    <p:spTree>
+      <p:nvGrpSpPr>
+        <p:cNvPr id="1" name=""/>
+        <p:cNvGrpSpPr/>
+        <p:nvPr/>
+      </p:nvGrpSpPr>
+      <p:grpSpPr>
+        <a:xfrm>
+          <a:off x="0" y="0"/>
+          <a:ext cx="0" cy="0"/>
+          <a:chOff x="0" y="0"/>
+          <a:chExt cx="0" cy="0"/>
+        </a:xfrm>
+      </p:grpSpPr>
+      <p:sp>
+        <p:nvSpPr>
+          <p:cNvPr id="3" name="Text Placeholder 2">
+            <a:extLst>
+              <a:ext uri="{FF2B5EF4-FFF2-40B4-BE49-F238E27FC236}">
+                <a16:creationId xmlns:a16="http://schemas.microsoft.com/office/drawing/2014/main" id="{73F47157-FAFA-287F-2C35-D8FED23AC8DD}"/>
+              </a:ext>
+            </a:extLst>
+          </p:cNvPr>
+          <p:cNvSpPr>
+            <a:spLocks noGrp="1"/>
+          </p:cNvSpPr>
+          <p:nvPr>
+            <p:ph type="body" idx="1"/>
+          </p:nvPr>
+        </p:nvSpPr>
+        <p:spPr>
+          <a:xfrm>
+            <a:off x="475129" y="143435"/>
+            <a:ext cx="11331389" cy="6355977"/>
+          </a:xfrm>
+        </p:spPr>
+        <p:txBody>
+          <a:bodyPr/>
+          <a:lstStyle/>
+          <a:p>
+            <a:pPr marL="152396" indent="0">
+              <a:buNone/>
+            </a:pPr>
+            <a:r>
+              <a:rPr lang="en-US" sz="1800" b="1" dirty="0"/>
+              <a:t>C# is Object-Oriented:</a:t>
+            </a:r>
+          </a:p>
+          <a:p>
+            <a:pPr marL="152396" indent="0">
+              <a:buNone/>
+            </a:pPr>
+            <a:r>
+              <a:rPr lang="en-US" sz="1800" dirty="0"/>
+              <a:t>Except for the primitive data types, all elements in C# are objects. Object-oriented is not a programming language, it is a programming technique or concept, or principle which defines a set of rules and regulations for organizing the data and instructions. The concepts provided by oops are as follows</a:t>
+            </a:r>
+          </a:p>
+          <a:p>
+            <a:r>
+              <a:rPr lang="en-US" sz="1800" dirty="0"/>
+              <a:t>Encapsulation</a:t>
+            </a:r>
+          </a:p>
+          <a:p>
+            <a:r>
+              <a:rPr lang="en-US" sz="1800" dirty="0"/>
+              <a:t>Abstraction</a:t>
+            </a:r>
+          </a:p>
+          <a:p>
+            <a:r>
+              <a:rPr lang="en-US" sz="1800" dirty="0"/>
+              <a:t>Polymorphism</a:t>
+            </a:r>
+          </a:p>
+          <a:p>
+            <a:r>
+              <a:rPr lang="en-US" sz="1800" dirty="0"/>
+              <a:t>Inheritance</a:t>
+            </a:r>
+          </a:p>
+          <a:p>
+            <a:pPr marL="152396" indent="0">
+              <a:buNone/>
+            </a:pPr>
+            <a:r>
+              <a:rPr lang="en-US" sz="1800" dirty="0"/>
+              <a:t>The Programming Language which supports these four features is known as an Object-Oriented Programming Language. And C# Programming Language supports these four features, so C# is Object-Oriented.</a:t>
+            </a:r>
+          </a:p>
+          <a:p>
+            <a:pPr marL="152396" indent="0">
+              <a:buNone/>
+            </a:pPr>
+            <a:r>
+              <a:rPr lang="en-US" sz="1800" b="1" dirty="0"/>
+              <a:t>Automatic Memory Management:</a:t>
+            </a:r>
+          </a:p>
+          <a:p>
+            <a:pPr marL="152396" indent="0">
+              <a:buNone/>
+            </a:pPr>
+            <a:r>
+              <a:rPr lang="en-US" sz="1800" dirty="0"/>
+              <a:t>The .NET Framework automatically manages memory allocation and de-allocation for objects. When a dot net application runs, lots of objects are created. At a given point in time, it is possible that some of those objects are not used by the application. Garbage Collector in .NET Framework is nothing but a Small Routine or you can say it is a Background Process that runs periodically and try to identify what objects are not being used currently by the application and de-allocates the memory of those objects. So, as a developer, we need not worry about how memory allocation and deallocation are done in .NET Applications.</a:t>
+            </a:r>
+          </a:p>
+          <a:p>
+            <a:pPr marL="152396" indent="0">
+              <a:buNone/>
+            </a:pPr>
+            <a:r>
+              <a:rPr lang="en-US" sz="1800" b="1" dirty="0"/>
+              <a:t>Exception Handling:</a:t>
+            </a:r>
+          </a:p>
+          <a:p>
+            <a:pPr marL="152396" indent="0">
+              <a:buNone/>
+            </a:pPr>
+            <a:r>
+              <a:rPr lang="en-US" sz="1800" dirty="0"/>
+              <a:t>C# Provides Strong Exception Handling Features which can be used to stop the Abnormal Termination of the program and you can also provide user-understandable messages when an exception is raised.</a:t>
+            </a:r>
+          </a:p>
+        </p:txBody>
+      </p:sp>
+    </p:spTree>
+    <p:extLst>
+      <p:ext uri="{BB962C8B-B14F-4D97-AF65-F5344CB8AC3E}">
+        <p14:creationId xmlns:p14="http://schemas.microsoft.com/office/powerpoint/2010/main" val="2579326457"/>
+      </p:ext>
+    </p:extLst>
+  </p:cSld>
+  <p:clrMapOvr>
+    <a:masterClrMapping/>
+  </p:clrMapOvr>
+</p:sld>
+</file>
+
+<file path=ppt/slides/slide21.xml><?xml version="1.0" encoding="utf-8"?>
 <p:sld xmlns:a="http://schemas.openxmlformats.org/drawingml/2006/main" xmlns:r="http://schemas.openxmlformats.org/officeDocument/2006/relationships" xmlns:p="http://schemas.openxmlformats.org/presentationml/2006/main">
   <p:cSld>
     <p:spTree>
@@ -28723,7 +29031,7 @@
           <p:cNvPr id="2" name="Title 1">
             <a:extLst>
               <a:ext uri="{FF2B5EF4-FFF2-40B4-BE49-F238E27FC236}">
-                <a16:creationId xmlns:a16="http://schemas.microsoft.com/office/drawing/2014/main" id="{93AAFD06-0D7B-2F11-E272-1C8383476237}"/>
+                <a16:creationId xmlns:a16="http://schemas.microsoft.com/office/drawing/2014/main" id="{215DB739-8219-B365-4D10-7D0C90716201}"/>
               </a:ext>
             </a:extLst>
           </p:cNvPr>
@@ -28734,14 +29042,19 @@
             <p:ph type="title"/>
           </p:nvPr>
         </p:nvSpPr>
-        <p:spPr/>
+        <p:spPr>
+          <a:xfrm>
+            <a:off x="600635" y="254459"/>
+            <a:ext cx="7521200" cy="675800"/>
+          </a:xfrm>
+        </p:spPr>
         <p:txBody>
           <a:bodyPr/>
           <a:lstStyle/>
           <a:p>
             <a:r>
-              <a:rPr lang="en-US" dirty="0"/>
-              <a:t>History Time</a:t>
+              <a:rPr lang="en-US" b="1" dirty="0"/>
+              <a:t>Features of C#</a:t>
             </a:r>
           </a:p>
         </p:txBody>
@@ -28751,7 +29064,7 @@
           <p:cNvPr id="3" name="Text Placeholder 2">
             <a:extLst>
               <a:ext uri="{FF2B5EF4-FFF2-40B4-BE49-F238E27FC236}">
-                <a16:creationId xmlns:a16="http://schemas.microsoft.com/office/drawing/2014/main" id="{3468B719-1855-26EB-1781-C7C6DE813841}"/>
+                <a16:creationId xmlns:a16="http://schemas.microsoft.com/office/drawing/2014/main" id="{7FCBE5D5-AAF0-7C95-69BF-873F1D83E48D}"/>
               </a:ext>
             </a:extLst>
           </p:cNvPr>
@@ -28764,8 +29077,8 @@
         </p:nvSpPr>
         <p:spPr>
           <a:xfrm>
-            <a:off x="609599" y="1610685"/>
-            <a:ext cx="11168543" cy="4915949"/>
+            <a:off x="304799" y="1097141"/>
+            <a:ext cx="11582401" cy="5506400"/>
           </a:xfrm>
         </p:spPr>
         <p:txBody>
@@ -28774,33 +29087,25 @@
           <a:p>
             <a:r>
               <a:rPr lang="en-US" dirty="0"/>
-              <a:t>Before C# there were tow languages in the C family :c and </a:t>
-            </a:r>
-            <a:r>
-              <a:rPr lang="en-US" dirty="0" err="1"/>
-              <a:t>c++</a:t>
-            </a:r>
-            <a:r>
-              <a:rPr lang="en-US" dirty="0"/>
-              <a:t>.</a:t>
+              <a:t>Simple: C# is a simple language in the sense that it provides a structured approach (to break the problem into parts), a rich set of library functions, data types, etc.</a:t>
             </a:r>
           </a:p>
           <a:p>
             <a:r>
               <a:rPr lang="en-US" dirty="0"/>
-              <a:t>When we compiled code with any of the above the compiler compiled our code to native code for the machine its running on e.g.(windows or macOS)</a:t>
+              <a:t>Modern Programming Language: C# programming is based upon the current trend and it is very powerful and simple for building scalable, interoperable, and robust applications.</a:t>
             </a:r>
           </a:p>
           <a:p>
             <a:r>
               <a:rPr lang="en-US" dirty="0"/>
-              <a:t>But we have different hardware's , and that means that the above wont be possible.</a:t>
+              <a:t>Object-Oriented: C# is an object-oriented programming language. OOPs makes development and maintenance easier whereas in Procedure-oriented programming language it is not easy to manage if code grows as the project size grows.</a:t>
             </a:r>
           </a:p>
           <a:p>
             <a:r>
               <a:rPr lang="en-US" dirty="0"/>
-              <a:t>C# however changed that </a:t>
+              <a:t>Type-Safe: C# type safe code can only access the memory location that it has permission to execute. Therefore, it improves the security of the program.</a:t>
             </a:r>
           </a:p>
         </p:txBody>
@@ -28808,7 +29113,7 @@
     </p:spTree>
     <p:extLst>
       <p:ext uri="{BB962C8B-B14F-4D97-AF65-F5344CB8AC3E}">
-        <p14:creationId xmlns:p14="http://schemas.microsoft.com/office/powerpoint/2010/main" val="2430405489"/>
+        <p14:creationId xmlns:p14="http://schemas.microsoft.com/office/powerpoint/2010/main" val="1317803477"/>
       </p:ext>
     </p:extLst>
   </p:cSld>
@@ -28818,7 +29123,103 @@
 </p:sld>
 </file>
 
-<file path=ppt/slides/slide4.xml><?xml version="1.0" encoding="utf-8"?>
+<file path=ppt/slides/slide22.xml><?xml version="1.0" encoding="utf-8"?>
+<p:sld xmlns:a="http://schemas.openxmlformats.org/drawingml/2006/main" xmlns:r="http://schemas.openxmlformats.org/officeDocument/2006/relationships" xmlns:p="http://schemas.openxmlformats.org/presentationml/2006/main">
+  <p:cSld>
+    <p:spTree>
+      <p:nvGrpSpPr>
+        <p:cNvPr id="1" name=""/>
+        <p:cNvGrpSpPr/>
+        <p:nvPr/>
+      </p:nvGrpSpPr>
+      <p:grpSpPr>
+        <a:xfrm>
+          <a:off x="0" y="0"/>
+          <a:ext cx="0" cy="0"/>
+          <a:chOff x="0" y="0"/>
+          <a:chExt cx="0" cy="0"/>
+        </a:xfrm>
+      </p:grpSpPr>
+      <p:sp>
+        <p:nvSpPr>
+          <p:cNvPr id="3" name="Text Placeholder 2">
+            <a:extLst>
+              <a:ext uri="{FF2B5EF4-FFF2-40B4-BE49-F238E27FC236}">
+                <a16:creationId xmlns:a16="http://schemas.microsoft.com/office/drawing/2014/main" id="{759309A1-C7FB-C64C-FB44-4B60E1E9F4BF}"/>
+              </a:ext>
+            </a:extLst>
+          </p:cNvPr>
+          <p:cNvSpPr>
+            <a:spLocks noGrp="1"/>
+          </p:cNvSpPr>
+          <p:nvPr>
+            <p:ph type="body" idx="1"/>
+          </p:nvPr>
+        </p:nvSpPr>
+        <p:spPr>
+          <a:xfrm>
+            <a:off x="430307" y="224118"/>
+            <a:ext cx="11438964" cy="6526306"/>
+          </a:xfrm>
+        </p:spPr>
+        <p:txBody>
+          <a:bodyPr/>
+          <a:lstStyle/>
+          <a:p>
+            <a:r>
+              <a:rPr lang="en-US" dirty="0"/>
+              <a:t>Interoperability: The interoperability process enables the C# programs to do almost anything that a native C++ application can do.</a:t>
+            </a:r>
+          </a:p>
+          <a:p>
+            <a:r>
+              <a:rPr lang="en-US" dirty="0"/>
+              <a:t>Scalable and Updateable: C# is an automatic scalable and updateable programming language. For updating our application, we delete the old files and update them with new ones.</a:t>
+            </a:r>
+          </a:p>
+          <a:p>
+            <a:r>
+              <a:rPr lang="en-US" dirty="0"/>
+              <a:t>Component Oriented: C# is a component-oriented programming language. It is the predominant software development methodology used to develop more robust and highly scalable applications.</a:t>
+            </a:r>
+          </a:p>
+          <a:p>
+            <a:r>
+              <a:rPr lang="en-US" dirty="0"/>
+              <a:t>Structured Programming Language: C# is a structured programming language in the sense that we can break the program into parts using functions. So, it is easy to understand and modify.</a:t>
+            </a:r>
+          </a:p>
+          <a:p>
+            <a:r>
+              <a:rPr lang="en-US" dirty="0"/>
+              <a:t>Rich Library: C# provides a lot of inbuilt functions that make development fast.</a:t>
+            </a:r>
+          </a:p>
+          <a:p>
+            <a:r>
+              <a:rPr lang="en-US" dirty="0"/>
+              <a:t>Fast Speed: The compilation and execution time of the C# language is fast.</a:t>
+            </a:r>
+          </a:p>
+          <a:p>
+            <a:endParaRPr lang="en-US" dirty="0"/>
+          </a:p>
+        </p:txBody>
+      </p:sp>
+    </p:spTree>
+    <p:extLst>
+      <p:ext uri="{BB962C8B-B14F-4D97-AF65-F5344CB8AC3E}">
+        <p14:creationId xmlns:p14="http://schemas.microsoft.com/office/powerpoint/2010/main" val="757154737"/>
+      </p:ext>
+    </p:extLst>
+  </p:cSld>
+  <p:clrMapOvr>
+    <a:masterClrMapping/>
+  </p:clrMapOvr>
+</p:sld>
+</file>
+
+<file path=ppt/slides/slide3.xml><?xml version="1.0" encoding="utf-8"?>
 <p:sld xmlns:a="http://schemas.openxmlformats.org/drawingml/2006/main" xmlns:r="http://schemas.openxmlformats.org/officeDocument/2006/relationships" xmlns:p="http://schemas.openxmlformats.org/presentationml/2006/main">
   <p:cSld>
     <p:spTree>
@@ -28944,7 +29345,7 @@
 </p:sld>
 </file>
 
-<file path=ppt/slides/slide5.xml><?xml version="1.0" encoding="utf-8"?>
+<file path=ppt/slides/slide4.xml><?xml version="1.0" encoding="utf-8"?>
 <p:sld xmlns:a="http://schemas.openxmlformats.org/drawingml/2006/main" xmlns:r="http://schemas.openxmlformats.org/officeDocument/2006/relationships" xmlns:p="http://schemas.openxmlformats.org/presentationml/2006/main">
   <p:cSld>
     <p:spTree>
@@ -29055,7 +29456,7 @@
 </p:sld>
 </file>
 
-<file path=ppt/slides/slide6.xml><?xml version="1.0" encoding="utf-8"?>
+<file path=ppt/slides/slide5.xml><?xml version="1.0" encoding="utf-8"?>
 <p:sld xmlns:a="http://schemas.openxmlformats.org/drawingml/2006/main" xmlns:r="http://schemas.openxmlformats.org/officeDocument/2006/relationships" xmlns:p="http://schemas.openxmlformats.org/presentationml/2006/main">
   <p:cSld>
     <p:spTree>
@@ -29195,6 +29596,196 @@
 </p:sld>
 </file>
 
+<file path=ppt/slides/slide6.xml><?xml version="1.0" encoding="utf-8"?>
+<p:sld xmlns:a="http://schemas.openxmlformats.org/drawingml/2006/main" xmlns:r="http://schemas.openxmlformats.org/officeDocument/2006/relationships" xmlns:p="http://schemas.openxmlformats.org/presentationml/2006/main">
+  <p:cSld>
+    <p:spTree>
+      <p:nvGrpSpPr>
+        <p:cNvPr id="1" name=""/>
+        <p:cNvGrpSpPr/>
+        <p:nvPr/>
+      </p:nvGrpSpPr>
+      <p:grpSpPr>
+        <a:xfrm>
+          <a:off x="0" y="0"/>
+          <a:ext cx="0" cy="0"/>
+          <a:chOff x="0" y="0"/>
+          <a:chExt cx="0" cy="0"/>
+        </a:xfrm>
+      </p:grpSpPr>
+      <p:sp>
+        <p:nvSpPr>
+          <p:cNvPr id="2" name="Title 1">
+            <a:extLst>
+              <a:ext uri="{FF2B5EF4-FFF2-40B4-BE49-F238E27FC236}">
+                <a16:creationId xmlns:a16="http://schemas.microsoft.com/office/drawing/2014/main" id="{A05F68E3-B9B8-2A58-DD21-F2C2E665ED15}"/>
+              </a:ext>
+            </a:extLst>
+          </p:cNvPr>
+          <p:cNvSpPr>
+            <a:spLocks noGrp="1"/>
+          </p:cNvSpPr>
+          <p:nvPr>
+            <p:ph type="title"/>
+          </p:nvPr>
+        </p:nvSpPr>
+        <p:spPr>
+          <a:xfrm>
+            <a:off x="609600" y="807467"/>
+            <a:ext cx="11109820" cy="668995"/>
+          </a:xfrm>
+        </p:spPr>
+        <p:txBody>
+          <a:bodyPr/>
+          <a:lstStyle/>
+          <a:p>
+            <a:r>
+              <a:rPr lang="en-US" dirty="0"/>
+              <a:t>Introduction to the  .NET Framework</a:t>
+            </a:r>
+          </a:p>
+        </p:txBody>
+      </p:sp>
+      <p:sp>
+        <p:nvSpPr>
+          <p:cNvPr id="3" name="Text Placeholder 2">
+            <a:extLst>
+              <a:ext uri="{FF2B5EF4-FFF2-40B4-BE49-F238E27FC236}">
+                <a16:creationId xmlns:a16="http://schemas.microsoft.com/office/drawing/2014/main" id="{F6501655-68EE-EF22-94CF-111088B41AEA}"/>
+              </a:ext>
+            </a:extLst>
+          </p:cNvPr>
+          <p:cNvSpPr>
+            <a:spLocks noGrp="1"/>
+          </p:cNvSpPr>
+          <p:nvPr>
+            <p:ph type="body" idx="1"/>
+          </p:nvPr>
+        </p:nvSpPr>
+        <p:spPr>
+          <a:xfrm>
+            <a:off x="609600" y="2382472"/>
+            <a:ext cx="11227266" cy="4085439"/>
+          </a:xfrm>
+        </p:spPr>
+        <p:txBody>
+          <a:bodyPr/>
+          <a:lstStyle/>
+          <a:p>
+            <a:pPr marL="152396" indent="0">
+              <a:buNone/>
+            </a:pPr>
+            <a:r>
+              <a:rPr lang="en-US" sz="1800" b="1" i="0" dirty="0">
+                <a:solidFill>
+                  <a:srgbClr val="000000"/>
+                </a:solidFill>
+                <a:effectLst/>
+                <a:latin typeface="arial" panose="020B0604020202020204" pitchFamily="34" charset="0"/>
+              </a:rPr>
+              <a:t>NET</a:t>
+            </a:r>
+            <a:r>
+              <a:rPr lang="en-US" sz="1800" b="0" i="0" dirty="0">
+                <a:solidFill>
+                  <a:srgbClr val="000000"/>
+                </a:solidFill>
+                <a:effectLst/>
+                <a:latin typeface="arial" panose="020B0604020202020204" pitchFamily="34" charset="0"/>
+              </a:rPr>
+              <a:t> stands for </a:t>
+            </a:r>
+            <a:r>
+              <a:rPr lang="en-US" sz="1800" b="1" i="0" dirty="0">
+                <a:solidFill>
+                  <a:srgbClr val="000000"/>
+                </a:solidFill>
+                <a:effectLst/>
+                <a:latin typeface="arial" panose="020B0604020202020204" pitchFamily="34" charset="0"/>
+              </a:rPr>
+              <a:t>Network Enabled Technology</a:t>
+            </a:r>
+            <a:r>
+              <a:rPr lang="en-US" sz="1800" b="0" i="0" dirty="0">
+                <a:solidFill>
+                  <a:srgbClr val="000000"/>
+                </a:solidFill>
+                <a:effectLst/>
+                <a:latin typeface="arial" panose="020B0604020202020204" pitchFamily="34" charset="0"/>
+              </a:rPr>
+              <a:t> (Internet). In .NET, dot (.) refers to </a:t>
+            </a:r>
+            <a:r>
+              <a:rPr lang="en-US" sz="1800" b="1" i="0" dirty="0">
+                <a:solidFill>
+                  <a:srgbClr val="000000"/>
+                </a:solidFill>
+                <a:effectLst/>
+                <a:latin typeface="arial" panose="020B0604020202020204" pitchFamily="34" charset="0"/>
+              </a:rPr>
+              <a:t>Object-Oriented,</a:t>
+            </a:r>
+            <a:r>
+              <a:rPr lang="en-US" sz="1800" b="0" i="0" dirty="0">
+                <a:solidFill>
+                  <a:srgbClr val="000000"/>
+                </a:solidFill>
+                <a:effectLst/>
+                <a:latin typeface="arial" panose="020B0604020202020204" pitchFamily="34" charset="0"/>
+              </a:rPr>
+              <a:t> and NET refers to the internet. So, the complete .NET means through Object-Oriented we can implement internet-based applications.</a:t>
+            </a:r>
+          </a:p>
+          <a:p>
+            <a:pPr marL="152396" indent="0">
+              <a:buNone/>
+            </a:pPr>
+            <a:r>
+              <a:rPr lang="en-US" sz="1800" dirty="0"/>
+              <a:t>According to Microsoft, .NET is a Free, Cross-Platform, Open-Source developer platform for building many different types of applications. With .NET, we can use multiple languages (C#, VB, F#, etc.), Editors (Visual Studio, Visual Studio Code, Visual Studio for Mac, OmniSharp, JetBrains Rider, etc.), and Libraries to build for Web, Mobile, Desktop, Games, IoT, and more.</a:t>
+            </a:r>
+          </a:p>
+          <a:p>
+            <a:pPr marL="152396" indent="0">
+              <a:buNone/>
+            </a:pPr>
+            <a:r>
+              <a:rPr lang="en-US" sz="1800" dirty="0"/>
+              <a:t>Cross Platform: Whether you are working in C#, F#, or Visual Basic, your code will run on any compatible operating system. You can build many types of apps with .NET. Some are Cross-Platform, and some target a specific set of operating systems and devices.</a:t>
+            </a:r>
+          </a:p>
+          <a:p>
+            <a:pPr marL="152396" indent="0">
+              <a:buNone/>
+            </a:pPr>
+            <a:r>
+              <a:rPr lang="en-US" sz="1800" dirty="0"/>
+              <a:t>Libraries: To extend functionality, Microsoft and others maintain a healthy .NET package ecosystem. </a:t>
+            </a:r>
+            <a:r>
+              <a:rPr lang="en-US" sz="1800" b="1" dirty="0"/>
+              <a:t>NuGet</a:t>
+            </a:r>
+            <a:r>
+              <a:rPr lang="en-US" sz="1800" dirty="0"/>
+              <a:t> is a package manager built specifically for .NET that contains over 100,000 packages.</a:t>
+            </a:r>
+          </a:p>
+        </p:txBody>
+      </p:sp>
+    </p:spTree>
+    <p:extLst>
+      <p:ext uri="{BB962C8B-B14F-4D97-AF65-F5344CB8AC3E}">
+        <p14:creationId xmlns:p14="http://schemas.microsoft.com/office/powerpoint/2010/main" val="2998746075"/>
+      </p:ext>
+    </p:extLst>
+  </p:cSld>
+  <p:clrMapOvr>
+    <a:masterClrMapping/>
+  </p:clrMapOvr>
+</p:sld>
+</file>
+
 <file path=ppt/slides/slide7.xml><?xml version="1.0" encoding="utf-8"?>
 <p:sld xmlns:a="http://schemas.openxmlformats.org/drawingml/2006/main" xmlns:r="http://schemas.openxmlformats.org/officeDocument/2006/relationships" xmlns:p="http://schemas.openxmlformats.org/presentationml/2006/main">
   <p:cSld>
@@ -29217,7 +29808,7 @@
           <p:cNvPr id="2" name="Title 1">
             <a:extLst>
               <a:ext uri="{FF2B5EF4-FFF2-40B4-BE49-F238E27FC236}">
-                <a16:creationId xmlns:a16="http://schemas.microsoft.com/office/drawing/2014/main" id="{16A587BF-5479-869C-A05F-A9ED427C4E48}"/>
+                <a16:creationId xmlns:a16="http://schemas.microsoft.com/office/drawing/2014/main" id="{CF74EB80-DA55-E5E0-A980-E8BCCEC1A376}"/>
               </a:ext>
             </a:extLst>
           </p:cNvPr>
@@ -29230,8 +29821,8 @@
         </p:nvSpPr>
         <p:spPr>
           <a:xfrm>
-            <a:off x="609599" y="807467"/>
-            <a:ext cx="10304477" cy="811608"/>
+            <a:off x="662730" y="379629"/>
+            <a:ext cx="10981189" cy="643828"/>
           </a:xfrm>
         </p:spPr>
         <p:txBody>
@@ -29240,7 +29831,7 @@
           <a:p>
             <a:r>
               <a:rPr lang="en-US" dirty="0"/>
-              <a:t>Programming Methodologies </a:t>
+              <a:t>What Does the .NET Framework Provide</a:t>
             </a:r>
           </a:p>
         </p:txBody>
@@ -29250,7 +29841,7 @@
           <p:cNvPr id="3" name="Text Placeholder 2">
             <a:extLst>
               <a:ext uri="{FF2B5EF4-FFF2-40B4-BE49-F238E27FC236}">
-                <a16:creationId xmlns:a16="http://schemas.microsoft.com/office/drawing/2014/main" id="{FC2DC61C-9A16-132A-71B2-05E2CC7D386A}"/>
+                <a16:creationId xmlns:a16="http://schemas.microsoft.com/office/drawing/2014/main" id="{5E85B5D1-1D9F-5FE9-0C45-F9AAB8C8FDDB}"/>
               </a:ext>
             </a:extLst>
           </p:cNvPr>
@@ -29263,8 +29854,8 @@
         </p:nvSpPr>
         <p:spPr>
           <a:xfrm>
-            <a:off x="609600" y="1736521"/>
-            <a:ext cx="11109820" cy="4613945"/>
+            <a:off x="609599" y="1132514"/>
+            <a:ext cx="11034319" cy="5049686"/>
           </a:xfrm>
         </p:spPr>
         <p:txBody>
@@ -29275,8 +29866,35 @@
               <a:buNone/>
             </a:pPr>
             <a:r>
+              <a:rPr lang="en-US" dirty="0"/>
+              <a:t>The .NET framework provides two component:</a:t>
+            </a:r>
+          </a:p>
+          <a:p>
+            <a:pPr marL="152396" indent="0">
+              <a:buNone/>
+            </a:pPr>
+            <a:endParaRPr lang="en-US" dirty="0"/>
+          </a:p>
+          <a:p>
+            <a:r>
+              <a:rPr lang="en-US" dirty="0"/>
+              <a:t>BCL (Base Class Libraries)</a:t>
+            </a:r>
+          </a:p>
+          <a:p>
+            <a:r>
+              <a:rPr lang="en-US" dirty="0"/>
+              <a:t>CLR (Common Language Runtime)</a:t>
+            </a:r>
+          </a:p>
+          <a:p>
+            <a:pPr marL="152396" indent="0">
+              <a:buNone/>
+            </a:pPr>
+            <a:r>
               <a:rPr lang="en-US" b="1" dirty="0"/>
-              <a:t>Monolithic Programming</a:t>
+              <a:t>What is BCL</a:t>
             </a:r>
           </a:p>
           <a:p>
@@ -29285,15 +29903,7 @@
             </a:pPr>
             <a:r>
               <a:rPr lang="en-US" dirty="0"/>
-              <a:t>The program code is present in a single block without any </a:t>
-            </a:r>
-            <a:r>
-              <a:rPr lang="en-US" dirty="0" err="1"/>
-              <a:t>divisio</a:t>
-            </a:r>
-            <a:r>
-              <a:rPr lang="en-US" dirty="0"/>
-              <a:t> of code int functions.</a:t>
+              <a:t>The Base Class Library  is installed when we install the .NET framework . It provides a set of API’s and types for common functionality e.g. types for string, date, numbers</a:t>
             </a:r>
           </a:p>
           <a:p>
@@ -29302,31 +29912,16 @@
             </a:pPr>
             <a:r>
               <a:rPr lang="en-US" dirty="0"/>
-              <a:t>It has some drawbacks :</a:t>
+              <a:t>BCL is a collection of pre-written code that provides many useful tools and building blocks form programmers when they are building their programs . </a:t>
             </a:r>
           </a:p>
           <a:p>
+            <a:pPr marL="152396" indent="0">
+              <a:buNone/>
+            </a:pPr>
             <a:r>
               <a:rPr lang="en-US" dirty="0"/>
-              <a:t>It is hard to reuse, debug</a:t>
-            </a:r>
-          </a:p>
-          <a:p>
-            <a:r>
-              <a:rPr lang="en-US" dirty="0"/>
-              <a:t>It is large and complex</a:t>
-            </a:r>
-          </a:p>
-          <a:p>
-            <a:r>
-              <a:rPr lang="en-US" dirty="0"/>
-              <a:t>Repetition of code</a:t>
-            </a:r>
-          </a:p>
-          <a:p>
-            <a:r>
-              <a:rPr lang="en-US" dirty="0"/>
-              <a:t>Maintainability is hard</a:t>
+              <a:t>(toybox)</a:t>
             </a:r>
           </a:p>
         </p:txBody>
@@ -29334,7 +29929,7 @@
     </p:spTree>
     <p:extLst>
       <p:ext uri="{BB962C8B-B14F-4D97-AF65-F5344CB8AC3E}">
-        <p14:creationId xmlns:p14="http://schemas.microsoft.com/office/powerpoint/2010/main" val="1936933803"/>
+        <p14:creationId xmlns:p14="http://schemas.microsoft.com/office/powerpoint/2010/main" val="2421184755"/>
       </p:ext>
     </p:extLst>
   </p:cSld>
@@ -29366,7 +29961,7 @@
           <p:cNvPr id="3" name="Text Placeholder 2">
             <a:extLst>
               <a:ext uri="{FF2B5EF4-FFF2-40B4-BE49-F238E27FC236}">
-                <a16:creationId xmlns:a16="http://schemas.microsoft.com/office/drawing/2014/main" id="{7866FBE4-E442-1FDB-DC93-99AA1FA5767D}"/>
+                <a16:creationId xmlns:a16="http://schemas.microsoft.com/office/drawing/2014/main" id="{AAA7E257-9CF8-C86A-EC8D-FA54DFC69DB0}"/>
               </a:ext>
             </a:extLst>
           </p:cNvPr>
@@ -29379,8 +29974,8 @@
         </p:nvSpPr>
         <p:spPr>
           <a:xfrm>
-            <a:off x="609600" y="503339"/>
-            <a:ext cx="10656815" cy="5678861"/>
+            <a:off x="609600" y="570451"/>
+            <a:ext cx="11227266" cy="5998129"/>
           </a:xfrm>
         </p:spPr>
         <p:txBody>
@@ -29392,7 +29987,7 @@
             </a:pPr>
             <a:r>
               <a:rPr lang="en-US" b="1" dirty="0"/>
-              <a:t>Procedural Programming</a:t>
+              <a:t>What is the CLR</a:t>
             </a:r>
           </a:p>
           <a:p>
@@ -29401,7 +29996,7 @@
             </a:pPr>
             <a:r>
               <a:rPr lang="en-US" dirty="0"/>
-              <a:t>In this paradigm the code is written in separate blocks and not in a single block and we can reuse the program whenever we want without repeating code.</a:t>
+              <a:t>CLR is the execution engine that handles running applications, it provides services like garbage collection, treading , exception handling and more.</a:t>
             </a:r>
           </a:p>
           <a:p>
@@ -29410,44 +30005,37 @@
             </a:pPr>
             <a:r>
               <a:rPr lang="en-US" dirty="0"/>
-              <a:t>Advantage</a:t>
+              <a:t>Its main work is to ensure that the programs you write in the .NET framework works properly.( babysitter) </a:t>
             </a:r>
           </a:p>
           <a:p>
+            <a:pPr marL="152396" indent="0" algn="l">
+              <a:buNone/>
+            </a:pPr>
             <a:r>
-              <a:rPr lang="en-US" sz="1800" dirty="0"/>
-              <a:t>It allows easy development of software and application by splitting down a program into smaller programs to execute a variety of tasks.</a:t>
+              <a:rPr lang="en-US" b="0" i="0" dirty="0">
+                <a:effectLst/>
+                <a:latin typeface="source-serif-pro"/>
+              </a:rPr>
+              <a:t>CLR Consist of a JIT compiler which is responsible for executing the Intermediate Code into Byte Code.</a:t>
             </a:r>
           </a:p>
           <a:p>
+            <a:pPr marL="152396" indent="0" algn="l">
+              <a:buNone/>
+            </a:pPr>
             <a:r>
-              <a:rPr lang="en-US" sz="1800" dirty="0"/>
-              <a:t>It increases the readability of code and makes it easier to understand the code.</a:t>
+              <a:rPr lang="en-US" b="0" i="0" dirty="0">
+                <a:effectLst/>
+                <a:latin typeface="source-serif-pro"/>
+              </a:rPr>
+              <a:t>The garbage collector manages the allocation and release of memory for an application. Therefore, developers working with managed code don’t have to write code to perform memory management tasks. Automatic memory management can eliminate common problems such as forgetting to free an object and causing a memory leak or attempting to access freed memory for an object that’s already been freed.</a:t>
             </a:r>
           </a:p>
           <a:p>
-            <a:r>
-              <a:rPr lang="en-US" sz="1800" dirty="0"/>
-              <a:t>It increases the reusability of code so that a particular piece of code can be used multiple times in a program whenever required.</a:t>
-            </a:r>
-          </a:p>
-          <a:p>
-            <a:r>
-              <a:rPr lang="en-US" sz="1800" dirty="0"/>
-              <a:t>It can be used to write bigger and more complex programs.</a:t>
-            </a:r>
-          </a:p>
-          <a:p>
-            <a:r>
-              <a:rPr lang="en-US" sz="1800" dirty="0"/>
-              <a:t>A team of programmers can work simultaneously and hence big projects can be done easily.</a:t>
-            </a:r>
-          </a:p>
-          <a:p>
-            <a:r>
-              <a:rPr lang="en-US" sz="1800" dirty="0"/>
-              <a:t>It is easy to understand the program</a:t>
-            </a:r>
+            <a:pPr marL="152396" indent="0">
+              <a:buNone/>
+            </a:pPr>
             <a:endParaRPr lang="en-US" dirty="0"/>
           </a:p>
         </p:txBody>
@@ -29455,7 +30043,7 @@
     </p:spTree>
     <p:extLst>
       <p:ext uri="{BB962C8B-B14F-4D97-AF65-F5344CB8AC3E}">
-        <p14:creationId xmlns:p14="http://schemas.microsoft.com/office/powerpoint/2010/main" val="4187694607"/>
+        <p14:creationId xmlns:p14="http://schemas.microsoft.com/office/powerpoint/2010/main" val="3052792063"/>
       </p:ext>
     </p:extLst>
   </p:cSld>
@@ -29484,10 +30072,10 @@
       </p:grpSpPr>
       <p:sp>
         <p:nvSpPr>
-          <p:cNvPr id="3" name="Text Placeholder 2">
+          <p:cNvPr id="2" name="Title 1">
             <a:extLst>
               <a:ext uri="{FF2B5EF4-FFF2-40B4-BE49-F238E27FC236}">
-                <a16:creationId xmlns:a16="http://schemas.microsoft.com/office/drawing/2014/main" id="{5F2B6193-0A59-C076-3CD6-29004B21B724}"/>
+                <a16:creationId xmlns:a16="http://schemas.microsoft.com/office/drawing/2014/main" id="{A6E057E5-8A64-538B-DF66-3625C40B9CC0}"/>
               </a:ext>
             </a:extLst>
           </p:cNvPr>
@@ -29495,114 +30083,59 @@
             <a:spLocks noGrp="1"/>
           </p:cNvSpPr>
           <p:nvPr>
-            <p:ph type="body" idx="1"/>
+            <p:ph type="title"/>
           </p:nvPr>
         </p:nvSpPr>
         <p:spPr>
           <a:xfrm>
-            <a:off x="609600" y="947956"/>
-            <a:ext cx="11210488" cy="5234244"/>
+            <a:off x="609600" y="807467"/>
+            <a:ext cx="8718958" cy="509605"/>
           </a:xfrm>
         </p:spPr>
         <p:txBody>
           <a:bodyPr/>
           <a:lstStyle/>
           <a:p>
-            <a:pPr marL="152396" indent="0">
-              <a:buNone/>
-            </a:pPr>
-            <a:r>
-              <a:rPr lang="en-US" b="1" dirty="0"/>
-              <a:t>Object-Oriented Programming (OOP)</a:t>
-            </a:r>
-          </a:p>
-          <a:p>
-            <a:pPr marL="152396" indent="0">
-              <a:buNone/>
-            </a:pPr>
             <a:r>
               <a:rPr lang="en-US" dirty="0"/>
-              <a:t>OOP is written in form of classes that contain  different data members and members functions ,and data grouped together. We can create objects from these classes .</a:t>
-            </a:r>
-          </a:p>
-          <a:p>
-            <a:pPr marL="152396" indent="0">
-              <a:buNone/>
-            </a:pPr>
-            <a:r>
-              <a:rPr lang="en-US" dirty="0"/>
-              <a:t>Advantages pf OOP</a:t>
-            </a:r>
-          </a:p>
-          <a:p>
-            <a:pPr marL="152396" indent="0">
-              <a:buNone/>
-            </a:pPr>
-            <a:r>
-              <a:rPr lang="en-US" sz="1800" dirty="0"/>
-              <a:t>We can build the programs from standard working modules that communicate with one another, rather than having to start writing the code from scratch which leads to saving development time and higher productivity.</a:t>
-            </a:r>
-          </a:p>
-          <a:p>
-            <a:pPr marL="152396" indent="0">
-              <a:buNone/>
-            </a:pPr>
-            <a:r>
-              <a:rPr lang="en-US" sz="1800" dirty="0"/>
-              <a:t>OOP language allows breaking the program into bit-sized problems that can be solved easily (one object at a time).</a:t>
-            </a:r>
-          </a:p>
-          <a:p>
-            <a:pPr marL="152396" indent="0">
-              <a:buNone/>
-            </a:pPr>
-            <a:r>
-              <a:rPr lang="en-US" sz="1800" dirty="0"/>
-              <a:t>OOP systems can be easily upgraded from small to large systems.</a:t>
-            </a:r>
-          </a:p>
-          <a:p>
-            <a:pPr marL="152396" indent="0">
-              <a:buNone/>
-            </a:pPr>
-            <a:r>
-              <a:rPr lang="en-US" sz="1800" dirty="0"/>
-              <a:t>The new technology promises greater programmer productivity, a better quality of software, and lesser maintenance cost.</a:t>
-            </a:r>
-          </a:p>
-          <a:p>
-            <a:pPr marL="152396" indent="0">
-              <a:buNone/>
-            </a:pPr>
-            <a:r>
-              <a:rPr lang="en-US" sz="1800" dirty="0"/>
-              <a:t>In OOPs, the code is distributed on a large scale that shows a higher level of abstraction.</a:t>
-            </a:r>
-          </a:p>
-          <a:p>
-            <a:pPr marL="152396" indent="0">
-              <a:buNone/>
-            </a:pPr>
-            <a:r>
-              <a:rPr lang="en-US" sz="1800" dirty="0"/>
-              <a:t>The class contains data and functions so the complexity is within the class, the programmer deals with the entire class.</a:t>
-            </a:r>
-          </a:p>
-          <a:p>
-            <a:pPr marL="152396" indent="0">
-              <a:buNone/>
-            </a:pPr>
-            <a:r>
-              <a:rPr lang="en-US" sz="1800" dirty="0"/>
-              <a:t>Reusability of the class within the code and outside the code is a big advantage.</a:t>
+              <a:t>C# Code Compilation and Execution</a:t>
             </a:r>
           </a:p>
         </p:txBody>
       </p:sp>
+      <p:pic>
+        <p:nvPicPr>
+          <p:cNvPr id="5" name="Picture 4">
+            <a:extLst>
+              <a:ext uri="{FF2B5EF4-FFF2-40B4-BE49-F238E27FC236}">
+                <a16:creationId xmlns:a16="http://schemas.microsoft.com/office/drawing/2014/main" id="{A4C6C5C8-E7A4-E22E-0A05-4396C752E70C}"/>
+              </a:ext>
+            </a:extLst>
+          </p:cNvPr>
+          <p:cNvPicPr>
+            <a:picLocks noChangeAspect="1"/>
+          </p:cNvPicPr>
+          <p:nvPr/>
+        </p:nvPicPr>
+        <p:blipFill rotWithShape="1">
+          <a:blip r:embed="rId2"/>
+          <a:srcRect t="1238"/>
+          <a:stretch/>
+        </p:blipFill>
+        <p:spPr>
+          <a:xfrm>
+            <a:off x="1946245" y="1853966"/>
+            <a:ext cx="4697529" cy="4366469"/>
+          </a:xfrm>
+          <a:prstGeom prst="rect">
+            <a:avLst/>
+          </a:prstGeom>
+        </p:spPr>
+      </p:pic>
     </p:spTree>
     <p:extLst>
       <p:ext uri="{BB962C8B-B14F-4D97-AF65-F5344CB8AC3E}">
-        <p14:creationId xmlns:p14="http://schemas.microsoft.com/office/powerpoint/2010/main" val="14339933"/>
+        <p14:creationId xmlns:p14="http://schemas.microsoft.com/office/powerpoint/2010/main" val="3624221266"/>
       </p:ext>
     </p:extLst>
   </p:cSld>

</xml_diff>